<commit_message>
update 27 mai 2025
</commit_message>
<xml_diff>
--- a/TA/Presentation1.pptx
+++ b/TA/Presentation1.pptx
@@ -5,12 +5,13 @@
     <p:sldMasterId id="2147483648" r:id="rId1"/>
   </p:sldMasterIdLst>
   <p:notesMasterIdLst>
-    <p:notesMasterId r:id="rId5"/>
+    <p:notesMasterId r:id="rId6"/>
   </p:notesMasterIdLst>
   <p:sldIdLst>
     <p:sldId id="257" r:id="rId2"/>
     <p:sldId id="256" r:id="rId3"/>
     <p:sldId id="258" r:id="rId4"/>
+    <p:sldId id="259" r:id="rId5"/>
   </p:sldIdLst>
   <p:sldSz cx="12192000" cy="6858000"/>
   <p:notesSz cx="6858000" cy="9144000"/>
@@ -109,6 +110,11 @@
       </a:defRPr>
     </a:lvl9pPr>
   </p:defaultTextStyle>
+  <p:extLst>
+    <p:ext uri="{EFAFB233-063F-42B5-8137-9DF3F51BA10A}">
+      <p15:sldGuideLst xmlns:p15="http://schemas.microsoft.com/office/powerpoint/2012/main"/>
+    </p:ext>
+  </p:extLst>
 </p:presentation>
 </file>
 
@@ -194,7 +200,7 @@
           <a:p>
             <a:fld id="{2256EC63-94B5-44A1-B72F-D6AB98CBDBE9}" type="datetimeFigureOut">
               <a:rPr lang="en-ID" smtClean="0"/>
-              <a:t>22/12/2024</a:t>
+              <a:t>13/05/2025</a:t>
             </a:fld>
             <a:endParaRPr lang="en-ID"/>
           </a:p>
@@ -506,7 +512,7 @@
           <a:bodyPr/>
           <a:lstStyle/>
           <a:p>
-            <a:endParaRPr lang="en-ID" dirty="0"/>
+            <a:endParaRPr lang="en-ID"/>
           </a:p>
         </p:txBody>
       </p:sp>
@@ -695,7 +701,7 @@
           <a:p>
             <a:fld id="{6A3EB80D-3CCC-4146-A2EA-1B3750C1B8BB}" type="datetimeFigureOut">
               <a:rPr lang="en-ID" smtClean="0"/>
-              <a:t>22/12/2024</a:t>
+              <a:t>13/05/2025</a:t>
             </a:fld>
             <a:endParaRPr lang="en-ID"/>
           </a:p>
@@ -895,7 +901,7 @@
           <a:p>
             <a:fld id="{6A3EB80D-3CCC-4146-A2EA-1B3750C1B8BB}" type="datetimeFigureOut">
               <a:rPr lang="en-ID" smtClean="0"/>
-              <a:t>22/12/2024</a:t>
+              <a:t>13/05/2025</a:t>
             </a:fld>
             <a:endParaRPr lang="en-ID"/>
           </a:p>
@@ -1105,7 +1111,7 @@
           <a:p>
             <a:fld id="{6A3EB80D-3CCC-4146-A2EA-1B3750C1B8BB}" type="datetimeFigureOut">
               <a:rPr lang="en-ID" smtClean="0"/>
-              <a:t>22/12/2024</a:t>
+              <a:t>13/05/2025</a:t>
             </a:fld>
             <a:endParaRPr lang="en-ID"/>
           </a:p>
@@ -1305,7 +1311,7 @@
           <a:p>
             <a:fld id="{6A3EB80D-3CCC-4146-A2EA-1B3750C1B8BB}" type="datetimeFigureOut">
               <a:rPr lang="en-ID" smtClean="0"/>
-              <a:t>22/12/2024</a:t>
+              <a:t>13/05/2025</a:t>
             </a:fld>
             <a:endParaRPr lang="en-ID"/>
           </a:p>
@@ -1581,7 +1587,7 @@
           <a:p>
             <a:fld id="{6A3EB80D-3CCC-4146-A2EA-1B3750C1B8BB}" type="datetimeFigureOut">
               <a:rPr lang="en-ID" smtClean="0"/>
-              <a:t>22/12/2024</a:t>
+              <a:t>13/05/2025</a:t>
             </a:fld>
             <a:endParaRPr lang="en-ID"/>
           </a:p>
@@ -1849,7 +1855,7 @@
           <a:p>
             <a:fld id="{6A3EB80D-3CCC-4146-A2EA-1B3750C1B8BB}" type="datetimeFigureOut">
               <a:rPr lang="en-ID" smtClean="0"/>
-              <a:t>22/12/2024</a:t>
+              <a:t>13/05/2025</a:t>
             </a:fld>
             <a:endParaRPr lang="en-ID"/>
           </a:p>
@@ -2264,7 +2270,7 @@
           <a:p>
             <a:fld id="{6A3EB80D-3CCC-4146-A2EA-1B3750C1B8BB}" type="datetimeFigureOut">
               <a:rPr lang="en-ID" smtClean="0"/>
-              <a:t>22/12/2024</a:t>
+              <a:t>13/05/2025</a:t>
             </a:fld>
             <a:endParaRPr lang="en-ID"/>
           </a:p>
@@ -2406,7 +2412,7 @@
           <a:p>
             <a:fld id="{6A3EB80D-3CCC-4146-A2EA-1B3750C1B8BB}" type="datetimeFigureOut">
               <a:rPr lang="en-ID" smtClean="0"/>
-              <a:t>22/12/2024</a:t>
+              <a:t>13/05/2025</a:t>
             </a:fld>
             <a:endParaRPr lang="en-ID"/>
           </a:p>
@@ -2519,7 +2525,7 @@
           <a:p>
             <a:fld id="{6A3EB80D-3CCC-4146-A2EA-1B3750C1B8BB}" type="datetimeFigureOut">
               <a:rPr lang="en-ID" smtClean="0"/>
-              <a:t>22/12/2024</a:t>
+              <a:t>13/05/2025</a:t>
             </a:fld>
             <a:endParaRPr lang="en-ID"/>
           </a:p>
@@ -2832,7 +2838,7 @@
           <a:p>
             <a:fld id="{6A3EB80D-3CCC-4146-A2EA-1B3750C1B8BB}" type="datetimeFigureOut">
               <a:rPr lang="en-ID" smtClean="0"/>
-              <a:t>22/12/2024</a:t>
+              <a:t>13/05/2025</a:t>
             </a:fld>
             <a:endParaRPr lang="en-ID"/>
           </a:p>
@@ -3121,7 +3127,7 @@
           <a:p>
             <a:fld id="{6A3EB80D-3CCC-4146-A2EA-1B3750C1B8BB}" type="datetimeFigureOut">
               <a:rPr lang="en-ID" smtClean="0"/>
-              <a:t>22/12/2024</a:t>
+              <a:t>13/05/2025</a:t>
             </a:fld>
             <a:endParaRPr lang="en-ID"/>
           </a:p>
@@ -3364,7 +3370,7 @@
           <a:p>
             <a:fld id="{6A3EB80D-3CCC-4146-A2EA-1B3750C1B8BB}" type="datetimeFigureOut">
               <a:rPr lang="en-ID" smtClean="0"/>
-              <a:t>22/12/2024</a:t>
+              <a:t>13/05/2025</a:t>
             </a:fld>
             <a:endParaRPr lang="en-ID"/>
           </a:p>
@@ -3827,7 +3833,7 @@
           <a:bodyPr/>
           <a:lstStyle/>
           <a:p>
-            <a:endParaRPr lang="en-ID" dirty="0"/>
+            <a:endParaRPr lang="en-ID"/>
           </a:p>
         </p:txBody>
       </p:sp>
@@ -3907,10 +3913,10 @@
           <a:p>
             <a:pPr algn="ctr"/>
             <a:r>
-              <a:rPr lang="en-US" sz="1400" dirty="0" err="1"/>
+              <a:rPr lang="en-US" sz="1400" err="1"/>
               <a:t>Mulai</a:t>
             </a:r>
-            <a:endParaRPr lang="en-ID" dirty="0"/>
+            <a:endParaRPr lang="en-ID"/>
           </a:p>
         </p:txBody>
       </p:sp>
@@ -3963,7 +3969,7 @@
           <a:p>
             <a:pPr algn="ctr"/>
             <a:r>
-              <a:rPr lang="en-US" sz="1200" dirty="0" err="1">
+              <a:rPr lang="en-US" sz="1200" err="1">
                 <a:solidFill>
                   <a:schemeClr val="tx1"/>
                 </a:solidFill>
@@ -3973,7 +3979,7 @@
               <a:t>Membaca</a:t>
             </a:r>
             <a:r>
-              <a:rPr lang="en-US" sz="1200" dirty="0">
+              <a:rPr lang="en-US" sz="1200">
                 <a:solidFill>
                   <a:schemeClr val="tx1"/>
                 </a:solidFill>
@@ -4031,7 +4037,7 @@
           <a:p>
             <a:pPr algn="ctr"/>
             <a:r>
-              <a:rPr lang="en-US" sz="1200" dirty="0" err="1">
+              <a:rPr lang="en-US" sz="1200" err="1">
                 <a:solidFill>
                   <a:schemeClr val="tx1"/>
                 </a:solidFill>
@@ -4041,7 +4047,7 @@
               <a:t>Inisialisasi</a:t>
             </a:r>
             <a:r>
-              <a:rPr lang="en-US" sz="1200" dirty="0">
+              <a:rPr lang="en-US" sz="1200">
                 <a:solidFill>
                   <a:schemeClr val="tx1"/>
                 </a:solidFill>
@@ -4194,7 +4200,7 @@
           <a:p>
             <a:pPr algn="ctr"/>
             <a:r>
-              <a:rPr lang="en-US" sz="1200" dirty="0" err="1">
+              <a:rPr lang="en-US" sz="1200" err="1">
                 <a:solidFill>
                   <a:schemeClr val="tx1"/>
                 </a:solidFill>
@@ -4204,7 +4210,7 @@
               <a:t>Mendeteksi</a:t>
             </a:r>
             <a:r>
-              <a:rPr lang="en-US" sz="1200" dirty="0">
+              <a:rPr lang="en-US" sz="1200">
                 <a:solidFill>
                   <a:schemeClr val="tx1"/>
                 </a:solidFill>
@@ -4245,7 +4251,7 @@
           <a:lstStyle/>
           <a:p>
             <a:r>
-              <a:rPr lang="en-US" sz="1200" dirty="0">
+              <a:rPr lang="en-US" sz="1200">
                 <a:latin typeface="Times New Roman" panose="02020603050405020304" pitchFamily="18" charset="0"/>
                 <a:cs typeface="Times New Roman" panose="02020603050405020304" pitchFamily="18" charset="0"/>
               </a:rPr>
@@ -4283,7 +4289,7 @@
           <a:lstStyle/>
           <a:p>
             <a:r>
-              <a:rPr lang="en-US" sz="1100" dirty="0">
+              <a:rPr lang="en-US" sz="1100">
                 <a:latin typeface="Times New Roman" panose="02020603050405020304" pitchFamily="18" charset="0"/>
                 <a:cs typeface="Times New Roman" panose="02020603050405020304" pitchFamily="18" charset="0"/>
               </a:rPr>
@@ -4341,7 +4347,7 @@
           <a:p>
             <a:pPr algn="ctr"/>
             <a:r>
-              <a:rPr lang="en-US" sz="1200" dirty="0" err="1">
+              <a:rPr lang="en-US" sz="1200" err="1">
                 <a:solidFill>
                   <a:schemeClr val="tx1"/>
                 </a:solidFill>
@@ -4351,7 +4357,7 @@
               <a:t>Mengirimkan</a:t>
             </a:r>
             <a:r>
-              <a:rPr lang="en-US" sz="1200" dirty="0">
+              <a:rPr lang="en-US" sz="1200">
                 <a:solidFill>
                   <a:schemeClr val="tx1"/>
                 </a:solidFill>
@@ -4412,7 +4418,7 @@
           <a:p>
             <a:pPr algn="ctr"/>
             <a:r>
-              <a:rPr lang="en-US" sz="1200" dirty="0" err="1">
+              <a:rPr lang="en-US" sz="1200" err="1">
                 <a:solidFill>
                   <a:schemeClr val="tx1"/>
                 </a:solidFill>
@@ -4422,7 +4428,7 @@
               <a:t>Menyalakan</a:t>
             </a:r>
             <a:r>
-              <a:rPr lang="en-US" sz="1200" dirty="0">
+              <a:rPr lang="en-US" sz="1200">
                 <a:solidFill>
                   <a:schemeClr val="tx1"/>
                 </a:solidFill>
@@ -4432,7 +4438,7 @@
               <a:t> </a:t>
             </a:r>
             <a:r>
-              <a:rPr lang="en-US" sz="1200" dirty="0" err="1">
+              <a:rPr lang="en-US" sz="1200" err="1">
                 <a:solidFill>
                   <a:schemeClr val="tx1"/>
                 </a:solidFill>
@@ -4441,7 +4447,7 @@
               </a:rPr>
               <a:t>Lampu</a:t>
             </a:r>
-            <a:endParaRPr lang="en-US" sz="1200" dirty="0">
+            <a:endParaRPr lang="en-US" sz="1200">
               <a:solidFill>
                 <a:schemeClr val="tx1"/>
               </a:solidFill>
@@ -4592,7 +4598,7 @@
           <a:p>
             <a:pPr algn="ctr"/>
             <a:r>
-              <a:rPr lang="en-US" sz="1200" dirty="0" err="1">
+              <a:rPr lang="en-US" sz="1200" err="1">
                 <a:solidFill>
                   <a:schemeClr val="tx1"/>
                 </a:solidFill>
@@ -4602,7 +4608,7 @@
               <a:t>Mengirimkan</a:t>
             </a:r>
             <a:r>
-              <a:rPr lang="en-US" sz="1200" dirty="0">
+              <a:rPr lang="en-US" sz="1200">
                 <a:solidFill>
                   <a:schemeClr val="tx1"/>
                 </a:solidFill>
@@ -4752,7 +4758,7 @@
           <a:p>
             <a:pPr algn="ctr"/>
             <a:r>
-              <a:rPr lang="en-US" sz="1200" dirty="0" err="1">
+              <a:rPr lang="en-US" sz="1200" err="1">
                 <a:solidFill>
                   <a:schemeClr val="tx1"/>
                 </a:solidFill>
@@ -4762,7 +4768,7 @@
               <a:t>Mematikan</a:t>
             </a:r>
             <a:r>
-              <a:rPr lang="en-US" sz="1200" dirty="0">
+              <a:rPr lang="en-US" sz="1200">
                 <a:solidFill>
                   <a:schemeClr val="tx1"/>
                 </a:solidFill>
@@ -4772,7 +4778,7 @@
               <a:t> </a:t>
             </a:r>
             <a:r>
-              <a:rPr lang="en-US" sz="1200" dirty="0" err="1">
+              <a:rPr lang="en-US" sz="1200" err="1">
                 <a:solidFill>
                   <a:schemeClr val="tx1"/>
                 </a:solidFill>
@@ -4781,7 +4787,7 @@
               </a:rPr>
               <a:t>Lampu</a:t>
             </a:r>
-            <a:endParaRPr lang="en-US" sz="1200" dirty="0">
+            <a:endParaRPr lang="en-US" sz="1200">
               <a:solidFill>
                 <a:schemeClr val="tx1"/>
               </a:solidFill>
@@ -4929,10 +4935,10 @@
           <a:p>
             <a:pPr algn="ctr"/>
             <a:r>
-              <a:rPr lang="en-US" sz="1400" dirty="0" err="1"/>
+              <a:rPr lang="en-US" sz="1400" err="1"/>
               <a:t>Selesai</a:t>
             </a:r>
-            <a:endParaRPr lang="en-ID" dirty="0"/>
+            <a:endParaRPr lang="en-ID"/>
           </a:p>
         </p:txBody>
       </p:sp>
@@ -5160,10 +5166,10 @@
           <a:p>
             <a:pPr algn="ctr"/>
             <a:r>
-              <a:rPr lang="en-US" sz="1400" dirty="0" err="1"/>
+              <a:rPr lang="en-US" sz="1400" err="1"/>
               <a:t>Mulai</a:t>
             </a:r>
-            <a:endParaRPr lang="en-ID" dirty="0"/>
+            <a:endParaRPr lang="en-ID"/>
           </a:p>
         </p:txBody>
       </p:sp>
@@ -5216,7 +5222,7 @@
           <a:p>
             <a:pPr algn="ctr"/>
             <a:r>
-              <a:rPr lang="en-US" sz="1200" dirty="0" err="1">
+              <a:rPr lang="en-US" sz="1200" err="1">
                 <a:solidFill>
                   <a:schemeClr val="tx1"/>
                 </a:solidFill>
@@ -5226,7 +5232,7 @@
               <a:t>Membaca</a:t>
             </a:r>
             <a:r>
-              <a:rPr lang="en-US" sz="1200" dirty="0">
+              <a:rPr lang="en-US" sz="1200">
                 <a:solidFill>
                   <a:schemeClr val="tx1"/>
                 </a:solidFill>
@@ -5284,7 +5290,7 @@
           <a:p>
             <a:pPr algn="ctr"/>
             <a:r>
-              <a:rPr lang="en-US" sz="1200" dirty="0" err="1">
+              <a:rPr lang="en-US" sz="1200" err="1">
                 <a:solidFill>
                   <a:schemeClr val="tx1"/>
                 </a:solidFill>
@@ -5294,7 +5300,7 @@
               <a:t>Inisialisasi</a:t>
             </a:r>
             <a:r>
-              <a:rPr lang="en-US" sz="1200" dirty="0">
+              <a:rPr lang="en-US" sz="1200">
                 <a:solidFill>
                   <a:schemeClr val="tx1"/>
                 </a:solidFill>
@@ -5447,7 +5453,7 @@
           <a:p>
             <a:pPr algn="ctr"/>
             <a:r>
-              <a:rPr lang="en-US" sz="1200" dirty="0" err="1">
+              <a:rPr lang="en-US" sz="1200" err="1">
                 <a:solidFill>
                   <a:schemeClr val="tx1"/>
                 </a:solidFill>
@@ -5457,7 +5463,7 @@
               <a:t>Menerima</a:t>
             </a:r>
             <a:r>
-              <a:rPr lang="en-US" sz="1200" dirty="0">
+              <a:rPr lang="en-US" sz="1200">
                 <a:solidFill>
                   <a:schemeClr val="tx1"/>
                 </a:solidFill>
@@ -5498,7 +5504,7 @@
           <a:lstStyle/>
           <a:p>
             <a:r>
-              <a:rPr lang="en-US" sz="1200" dirty="0">
+              <a:rPr lang="en-US" sz="1200">
                 <a:latin typeface="Times New Roman" panose="02020603050405020304" pitchFamily="18" charset="0"/>
                 <a:cs typeface="Times New Roman" panose="02020603050405020304" pitchFamily="18" charset="0"/>
               </a:rPr>
@@ -5536,7 +5542,7 @@
           <a:lstStyle/>
           <a:p>
             <a:r>
-              <a:rPr lang="en-US" sz="1100" dirty="0">
+              <a:rPr lang="en-US" sz="1100">
                 <a:latin typeface="Times New Roman" panose="02020603050405020304" pitchFamily="18" charset="0"/>
                 <a:cs typeface="Times New Roman" panose="02020603050405020304" pitchFamily="18" charset="0"/>
               </a:rPr>
@@ -5594,7 +5600,7 @@
           <a:p>
             <a:pPr algn="ctr"/>
             <a:r>
-              <a:rPr lang="en-US" sz="1200" dirty="0" err="1">
+              <a:rPr lang="en-US" sz="1200" err="1">
                 <a:solidFill>
                   <a:schemeClr val="tx1"/>
                 </a:solidFill>
@@ -5604,7 +5610,7 @@
               <a:t>Menampilkan</a:t>
             </a:r>
             <a:r>
-              <a:rPr lang="en-US" sz="1200" dirty="0">
+              <a:rPr lang="en-US" sz="1200">
                 <a:solidFill>
                   <a:schemeClr val="tx1"/>
                 </a:solidFill>
@@ -5614,7 +5620,7 @@
               <a:t> Data Slot </a:t>
             </a:r>
             <a:r>
-              <a:rPr lang="en-US" sz="1200" dirty="0" err="1">
+              <a:rPr lang="en-US" sz="1200" err="1">
                 <a:solidFill>
                   <a:schemeClr val="tx1"/>
                 </a:solidFill>
@@ -5624,7 +5630,7 @@
               <a:t>Parkir</a:t>
             </a:r>
             <a:r>
-              <a:rPr lang="en-US" sz="1200" dirty="0">
+              <a:rPr lang="en-US" sz="1200">
                 <a:solidFill>
                   <a:schemeClr val="tx1"/>
                 </a:solidFill>
@@ -5909,10 +5915,10 @@
           <a:p>
             <a:pPr algn="ctr"/>
             <a:r>
-              <a:rPr lang="en-US" sz="1400" dirty="0" err="1"/>
+              <a:rPr lang="en-US" sz="1400" err="1"/>
               <a:t>Selesai</a:t>
             </a:r>
-            <a:endParaRPr lang="en-ID" dirty="0"/>
+            <a:endParaRPr lang="en-ID"/>
           </a:p>
         </p:txBody>
       </p:sp>
@@ -6152,7 +6158,7 @@
           <a:p>
             <a:pPr algn="ctr"/>
             <a:r>
-              <a:rPr lang="en-US" sz="1200" dirty="0">
+              <a:rPr lang="en-US" sz="1200">
                 <a:solidFill>
                   <a:schemeClr val="tx1"/>
                 </a:solidFill>
@@ -6213,7 +6219,7 @@
           <a:p>
             <a:pPr algn="ctr"/>
             <a:r>
-              <a:rPr lang="en-US" sz="1200" dirty="0">
+              <a:rPr lang="en-US" sz="1200">
                 <a:solidFill>
                   <a:schemeClr val="tx1"/>
                 </a:solidFill>
@@ -6274,7 +6280,7 @@
           <a:p>
             <a:pPr algn="ctr"/>
             <a:r>
-              <a:rPr lang="en-US" sz="1200" dirty="0" err="1">
+              <a:rPr lang="en-US" sz="1200" err="1">
                 <a:solidFill>
                   <a:schemeClr val="tx1"/>
                 </a:solidFill>
@@ -6284,7 +6290,7 @@
               <a:t>Menyalakan</a:t>
             </a:r>
             <a:r>
-              <a:rPr lang="en-US" sz="1200" dirty="0">
+              <a:rPr lang="en-US" sz="1200">
                 <a:solidFill>
                   <a:schemeClr val="tx1"/>
                 </a:solidFill>
@@ -6294,7 +6300,7 @@
               <a:t> </a:t>
             </a:r>
             <a:r>
-              <a:rPr lang="en-US" sz="1200" dirty="0" err="1">
+              <a:rPr lang="en-US" sz="1200" err="1">
                 <a:solidFill>
                   <a:schemeClr val="tx1"/>
                 </a:solidFill>
@@ -6303,7 +6309,7 @@
               </a:rPr>
               <a:t>Waterpump</a:t>
             </a:r>
-            <a:endParaRPr lang="en-US" sz="1200" dirty="0">
+            <a:endParaRPr lang="en-US" sz="1200">
               <a:solidFill>
                 <a:schemeClr val="tx1"/>
               </a:solidFill>
@@ -6362,7 +6368,7 @@
           <a:p>
             <a:pPr algn="ctr"/>
             <a:r>
-              <a:rPr lang="en-US" sz="1200" dirty="0">
+              <a:rPr lang="en-US" sz="1200">
                 <a:solidFill>
                   <a:schemeClr val="tx1"/>
                 </a:solidFill>
@@ -6559,7 +6565,7 @@
           <a:p>
             <a:pPr algn="ctr"/>
             <a:r>
-              <a:rPr lang="en-US" sz="1200" dirty="0">
+              <a:rPr lang="en-US" sz="1200">
                 <a:solidFill>
                   <a:schemeClr val="tx1"/>
                 </a:solidFill>
@@ -6615,14 +6621,14 @@
           <a:p>
             <a:pPr algn="ctr"/>
             <a:r>
-              <a:rPr lang="en-US" sz="1200" dirty="0"/>
+              <a:rPr lang="en-US" sz="1200"/>
               <a:t>Masukkan Jarak </a:t>
             </a:r>
             <a:r>
-              <a:rPr lang="en-US" sz="1200" dirty="0" err="1"/>
+              <a:rPr lang="en-US" sz="1200" err="1"/>
               <a:t>semprot</a:t>
             </a:r>
-            <a:endParaRPr lang="en-ID" sz="1200" dirty="0"/>
+            <a:endParaRPr lang="en-ID" sz="1200"/>
           </a:p>
         </p:txBody>
       </p:sp>
@@ -6675,7 +6681,7 @@
           <a:p>
             <a:pPr algn="ctr"/>
             <a:r>
-              <a:rPr lang="en-US" sz="1200" dirty="0">
+              <a:rPr lang="en-US" sz="1200">
                 <a:solidFill>
                   <a:schemeClr val="tx1"/>
                 </a:solidFill>
@@ -6685,7 +6691,7 @@
               <a:t>Jarak </a:t>
             </a:r>
             <a:r>
-              <a:rPr lang="en-US" sz="1200" dirty="0" err="1">
+              <a:rPr lang="en-US" sz="1200" err="1">
                 <a:solidFill>
                   <a:schemeClr val="tx1"/>
                 </a:solidFill>
@@ -6694,7 +6700,7 @@
               </a:rPr>
               <a:t>Semprot</a:t>
             </a:r>
-            <a:endParaRPr lang="en-US" sz="1200" dirty="0">
+            <a:endParaRPr lang="en-US" sz="1200">
               <a:solidFill>
                 <a:schemeClr val="tx1"/>
               </a:solidFill>
@@ -6933,13 +6939,13 @@
           <a:lstStyle/>
           <a:p>
             <a:r>
-              <a:rPr lang="en-US" sz="1200" dirty="0" err="1">
+              <a:rPr lang="en-US" sz="1200" err="1">
                 <a:latin typeface="Times New Roman" panose="02020603050405020304" pitchFamily="18" charset="0"/>
                 <a:cs typeface="Times New Roman" panose="02020603050405020304" pitchFamily="18" charset="0"/>
               </a:rPr>
               <a:t>tidak</a:t>
             </a:r>
-            <a:endParaRPr lang="en-US" sz="1200" dirty="0">
+            <a:endParaRPr lang="en-US" sz="1200">
               <a:latin typeface="Times New Roman" panose="02020603050405020304" pitchFamily="18" charset="0"/>
               <a:cs typeface="Times New Roman" panose="02020603050405020304" pitchFamily="18" charset="0"/>
             </a:endParaRPr>
@@ -7041,7 +7047,7 @@
           <a:p>
             <a:pPr algn="ctr"/>
             <a:r>
-              <a:rPr lang="en-US" sz="1200" dirty="0" err="1">
+              <a:rPr lang="en-US" sz="1200" err="1">
                 <a:solidFill>
                   <a:schemeClr val="tx1"/>
                 </a:solidFill>
@@ -7051,7 +7057,7 @@
               <a:t>Menekan</a:t>
             </a:r>
             <a:r>
-              <a:rPr lang="en-US" sz="1200" dirty="0">
+              <a:rPr lang="en-US" sz="1200">
                 <a:solidFill>
                   <a:schemeClr val="tx1"/>
                 </a:solidFill>
@@ -7061,7 +7067,7 @@
               <a:t> </a:t>
             </a:r>
             <a:r>
-              <a:rPr lang="en-US" sz="1200" dirty="0" err="1">
+              <a:rPr lang="en-US" sz="1200" err="1">
                 <a:solidFill>
                   <a:schemeClr val="tx1"/>
                 </a:solidFill>
@@ -7071,7 +7077,7 @@
               <a:t>Tombol</a:t>
             </a:r>
             <a:r>
-              <a:rPr lang="en-US" sz="1200" dirty="0">
+              <a:rPr lang="en-US" sz="1200">
                 <a:solidFill>
                   <a:schemeClr val="tx1"/>
                 </a:solidFill>
@@ -7247,13 +7253,13 @@
           <a:lstStyle/>
           <a:p>
             <a:r>
-              <a:rPr lang="en-US" sz="1200" dirty="0" err="1">
+              <a:rPr lang="en-US" sz="1200" err="1">
                 <a:latin typeface="Times New Roman" panose="02020603050405020304" pitchFamily="18" charset="0"/>
                 <a:cs typeface="Times New Roman" panose="02020603050405020304" pitchFamily="18" charset="0"/>
               </a:rPr>
               <a:t>tidak</a:t>
             </a:r>
-            <a:endParaRPr lang="en-US" sz="1200" dirty="0">
+            <a:endParaRPr lang="en-US" sz="1200">
               <a:latin typeface="Times New Roman" panose="02020603050405020304" pitchFamily="18" charset="0"/>
               <a:cs typeface="Times New Roman" panose="02020603050405020304" pitchFamily="18" charset="0"/>
             </a:endParaRPr>
@@ -7377,13 +7383,13 @@
           <a:lstStyle/>
           <a:p>
             <a:r>
-              <a:rPr lang="en-US" sz="1200" dirty="0" err="1">
+              <a:rPr lang="en-US" sz="1200" err="1">
                 <a:latin typeface="Times New Roman" panose="02020603050405020304" pitchFamily="18" charset="0"/>
                 <a:cs typeface="Times New Roman" panose="02020603050405020304" pitchFamily="18" charset="0"/>
               </a:rPr>
               <a:t>ya</a:t>
             </a:r>
-            <a:endParaRPr lang="en-US" sz="1200" dirty="0">
+            <a:endParaRPr lang="en-US" sz="1200">
               <a:latin typeface="Times New Roman" panose="02020603050405020304" pitchFamily="18" charset="0"/>
               <a:cs typeface="Times New Roman" panose="02020603050405020304" pitchFamily="18" charset="0"/>
             </a:endParaRPr>
@@ -7419,13 +7425,13 @@
           <a:lstStyle/>
           <a:p>
             <a:r>
-              <a:rPr lang="en-US" sz="1200" dirty="0" err="1">
+              <a:rPr lang="en-US" sz="1200" err="1">
                 <a:latin typeface="Times New Roman" panose="02020603050405020304" pitchFamily="18" charset="0"/>
                 <a:cs typeface="Times New Roman" panose="02020603050405020304" pitchFamily="18" charset="0"/>
               </a:rPr>
               <a:t>ya</a:t>
             </a:r>
-            <a:endParaRPr lang="en-US" sz="1200" dirty="0">
+            <a:endParaRPr lang="en-US" sz="1200">
               <a:latin typeface="Times New Roman" panose="02020603050405020304" pitchFamily="18" charset="0"/>
               <a:cs typeface="Times New Roman" panose="02020603050405020304" pitchFamily="18" charset="0"/>
             </a:endParaRPr>
@@ -7540,7 +7546,7 @@
           <a:p>
             <a:pPr algn="ctr"/>
             <a:r>
-              <a:rPr lang="en-US" sz="1200" dirty="0">
+              <a:rPr lang="en-US" sz="1200">
                 <a:solidFill>
                   <a:schemeClr val="tx1"/>
                 </a:solidFill>
@@ -7550,7 +7556,7 @@
               <a:t>Akhir Jarak </a:t>
             </a:r>
             <a:r>
-              <a:rPr lang="en-US" sz="1200" dirty="0" err="1">
+              <a:rPr lang="en-US" sz="1200" err="1">
                 <a:solidFill>
                   <a:schemeClr val="tx1"/>
                 </a:solidFill>
@@ -7559,7 +7565,7 @@
               </a:rPr>
               <a:t>semprot</a:t>
             </a:r>
-            <a:endParaRPr lang="en-US" sz="1200" dirty="0">
+            <a:endParaRPr lang="en-US" sz="1200">
               <a:solidFill>
                 <a:schemeClr val="tx1"/>
               </a:solidFill>
@@ -7618,7 +7624,7 @@
           <a:p>
             <a:pPr algn="ctr"/>
             <a:r>
-              <a:rPr lang="en-US" sz="1100" dirty="0" err="1">
+              <a:rPr lang="en-US" sz="1100" err="1">
                 <a:solidFill>
                   <a:schemeClr val="tx1"/>
                 </a:solidFill>
@@ -7628,7 +7634,7 @@
               <a:t>Menekan</a:t>
             </a:r>
             <a:r>
-              <a:rPr lang="en-US" sz="1100" dirty="0">
+              <a:rPr lang="en-US" sz="1100">
                 <a:solidFill>
                   <a:schemeClr val="tx1"/>
                 </a:solidFill>
@@ -7638,7 +7644,7 @@
               <a:t> </a:t>
             </a:r>
             <a:r>
-              <a:rPr lang="en-US" sz="1100" dirty="0" err="1">
+              <a:rPr lang="en-US" sz="1100" err="1">
                 <a:solidFill>
                   <a:schemeClr val="tx1"/>
                 </a:solidFill>
@@ -7648,7 +7654,7 @@
               <a:t>Tombol</a:t>
             </a:r>
             <a:r>
-              <a:rPr lang="en-US" sz="1100" dirty="0">
+              <a:rPr lang="en-US" sz="1100">
                 <a:solidFill>
                   <a:schemeClr val="tx1"/>
                 </a:solidFill>
@@ -7973,7 +7979,7 @@
           <a:p>
             <a:pPr algn="ctr"/>
             <a:r>
-              <a:rPr lang="en-US" sz="1200" dirty="0" err="1">
+              <a:rPr lang="en-US" sz="1200" err="1">
                 <a:solidFill>
                   <a:schemeClr val="tx1"/>
                 </a:solidFill>
@@ -7983,7 +7989,7 @@
               <a:t>Matikan</a:t>
             </a:r>
             <a:r>
-              <a:rPr lang="en-US" sz="1200" dirty="0">
+              <a:rPr lang="en-US" sz="1200">
                 <a:solidFill>
                   <a:schemeClr val="tx1"/>
                 </a:solidFill>
@@ -7993,7 +7999,7 @@
               <a:t> </a:t>
             </a:r>
             <a:r>
-              <a:rPr lang="en-US" sz="1200" dirty="0" err="1">
+              <a:rPr lang="en-US" sz="1200" err="1">
                 <a:solidFill>
                   <a:schemeClr val="tx1"/>
                 </a:solidFill>
@@ -8002,7 +8008,7 @@
               </a:rPr>
               <a:t>Waterpump</a:t>
             </a:r>
-            <a:endParaRPr lang="en-US" sz="1200" dirty="0">
+            <a:endParaRPr lang="en-US" sz="1200">
               <a:solidFill>
                 <a:schemeClr val="tx1"/>
               </a:solidFill>
@@ -8131,13 +8137,13 @@
           <a:lstStyle/>
           <a:p>
             <a:r>
-              <a:rPr lang="en-US" sz="1200" dirty="0" err="1">
+              <a:rPr lang="en-US" sz="1200" err="1">
                 <a:latin typeface="Times New Roman" panose="02020603050405020304" pitchFamily="18" charset="0"/>
                 <a:cs typeface="Times New Roman" panose="02020603050405020304" pitchFamily="18" charset="0"/>
               </a:rPr>
               <a:t>tidak</a:t>
             </a:r>
-            <a:endParaRPr lang="en-US" sz="1200" dirty="0">
+            <a:endParaRPr lang="en-US" sz="1200">
               <a:latin typeface="Times New Roman" panose="02020603050405020304" pitchFamily="18" charset="0"/>
               <a:cs typeface="Times New Roman" panose="02020603050405020304" pitchFamily="18" charset="0"/>
             </a:endParaRPr>
@@ -8158,7 +8164,7 @@
         </p:nvSpPr>
         <p:spPr>
           <a:xfrm>
-            <a:off x="10563335" y="2369185"/>
+            <a:off x="10608353" y="2441424"/>
             <a:ext cx="518161" cy="276999"/>
           </a:xfrm>
           <a:prstGeom prst="rect">
@@ -8173,13 +8179,13 @@
           <a:lstStyle/>
           <a:p>
             <a:r>
-              <a:rPr lang="en-US" sz="1200" dirty="0" err="1">
+              <a:rPr lang="en-US" sz="1200" err="1">
                 <a:latin typeface="Times New Roman" panose="02020603050405020304" pitchFamily="18" charset="0"/>
                 <a:cs typeface="Times New Roman" panose="02020603050405020304" pitchFamily="18" charset="0"/>
               </a:rPr>
               <a:t>tidak</a:t>
             </a:r>
-            <a:endParaRPr lang="en-US" sz="1200" dirty="0">
+            <a:endParaRPr lang="en-US" sz="1200">
               <a:latin typeface="Times New Roman" panose="02020603050405020304" pitchFamily="18" charset="0"/>
               <a:cs typeface="Times New Roman" panose="02020603050405020304" pitchFamily="18" charset="0"/>
             </a:endParaRPr>
@@ -8258,13 +8264,13 @@
           <a:lstStyle/>
           <a:p>
             <a:r>
-              <a:rPr lang="en-US" sz="1200" dirty="0" err="1">
+              <a:rPr lang="en-US" sz="1200" err="1">
                 <a:latin typeface="Times New Roman" panose="02020603050405020304" pitchFamily="18" charset="0"/>
                 <a:cs typeface="Times New Roman" panose="02020603050405020304" pitchFamily="18" charset="0"/>
               </a:rPr>
               <a:t>ya</a:t>
             </a:r>
-            <a:endParaRPr lang="en-US" sz="1200" dirty="0">
+            <a:endParaRPr lang="en-US" sz="1200">
               <a:latin typeface="Times New Roman" panose="02020603050405020304" pitchFamily="18" charset="0"/>
               <a:cs typeface="Times New Roman" panose="02020603050405020304" pitchFamily="18" charset="0"/>
             </a:endParaRPr>
@@ -8300,13 +8306,13 @@
           <a:lstStyle/>
           <a:p>
             <a:r>
-              <a:rPr lang="en-US" sz="1200" dirty="0" err="1">
+              <a:rPr lang="en-US" sz="1200" err="1">
                 <a:latin typeface="Times New Roman" panose="02020603050405020304" pitchFamily="18" charset="0"/>
                 <a:cs typeface="Times New Roman" panose="02020603050405020304" pitchFamily="18" charset="0"/>
               </a:rPr>
               <a:t>ya</a:t>
             </a:r>
-            <a:endParaRPr lang="en-US" sz="1200" dirty="0">
+            <a:endParaRPr lang="en-US" sz="1200">
               <a:latin typeface="Times New Roman" panose="02020603050405020304" pitchFamily="18" charset="0"/>
               <a:cs typeface="Times New Roman" panose="02020603050405020304" pitchFamily="18" charset="0"/>
             </a:endParaRPr>
@@ -8523,6 +8529,2103 @@
     <p:extLst>
       <p:ext uri="{BB962C8B-B14F-4D97-AF65-F5344CB8AC3E}">
         <p14:creationId xmlns:p14="http://schemas.microsoft.com/office/powerpoint/2010/main" val="3564011572"/>
+      </p:ext>
+    </p:extLst>
+  </p:cSld>
+  <p:clrMapOvr>
+    <a:masterClrMapping/>
+  </p:clrMapOvr>
+</p:sld>
+</file>
+
+<file path=ppt/slides/slide4.xml><?xml version="1.0" encoding="utf-8"?>
+<p:sld xmlns:a="http://schemas.openxmlformats.org/drawingml/2006/main" xmlns:r="http://schemas.openxmlformats.org/officeDocument/2006/relationships" xmlns:p="http://schemas.openxmlformats.org/presentationml/2006/main">
+  <p:cSld>
+    <p:spTree>
+      <p:nvGrpSpPr>
+        <p:cNvPr id="1" name=""/>
+        <p:cNvGrpSpPr/>
+        <p:nvPr/>
+      </p:nvGrpSpPr>
+      <p:grpSpPr>
+        <a:xfrm>
+          <a:off x="0" y="0"/>
+          <a:ext cx="0" cy="0"/>
+          <a:chOff x="0" y="0"/>
+          <a:chExt cx="0" cy="0"/>
+        </a:xfrm>
+      </p:grpSpPr>
+      <p:sp>
+        <p:nvSpPr>
+          <p:cNvPr id="4" name="Oval 3">
+            <a:extLst>
+              <a:ext uri="{FF2B5EF4-FFF2-40B4-BE49-F238E27FC236}">
+                <a16:creationId xmlns:a16="http://schemas.microsoft.com/office/drawing/2014/main" id="{ADE53A2E-B1E2-A62C-0ED8-889A512110F5}"/>
+              </a:ext>
+            </a:extLst>
+          </p:cNvPr>
+          <p:cNvSpPr/>
+          <p:nvPr/>
+        </p:nvSpPr>
+        <p:spPr>
+          <a:xfrm>
+            <a:off x="2207455" y="700453"/>
+            <a:ext cx="1280160" cy="445087"/>
+          </a:xfrm>
+          <a:prstGeom prst="ellipse">
+            <a:avLst/>
+          </a:prstGeom>
+          <a:ln>
+            <a:solidFill>
+              <a:schemeClr val="tx1"/>
+            </a:solidFill>
+          </a:ln>
+        </p:spPr>
+        <p:style>
+          <a:lnRef idx="2">
+            <a:schemeClr val="accent6"/>
+          </a:lnRef>
+          <a:fillRef idx="1">
+            <a:schemeClr val="lt1"/>
+          </a:fillRef>
+          <a:effectRef idx="0">
+            <a:schemeClr val="accent6"/>
+          </a:effectRef>
+          <a:fontRef idx="minor">
+            <a:schemeClr val="dk1"/>
+          </a:fontRef>
+        </p:style>
+        <p:txBody>
+          <a:bodyPr rtlCol="0" anchor="ctr"/>
+          <a:lstStyle/>
+          <a:p>
+            <a:pPr algn="ctr"/>
+            <a:r>
+              <a:rPr lang="en-US" sz="1400" err="1"/>
+              <a:t>Mulai</a:t>
+            </a:r>
+            <a:endParaRPr lang="en-ID"/>
+          </a:p>
+        </p:txBody>
+      </p:sp>
+      <p:sp>
+        <p:nvSpPr>
+          <p:cNvPr id="6" name="Flowchart: Data 5">
+            <a:extLst>
+              <a:ext uri="{FF2B5EF4-FFF2-40B4-BE49-F238E27FC236}">
+                <a16:creationId xmlns:a16="http://schemas.microsoft.com/office/drawing/2014/main" id="{B08D5E60-5BDC-11B0-84AA-D67EE9D08BC6}"/>
+              </a:ext>
+            </a:extLst>
+          </p:cNvPr>
+          <p:cNvSpPr/>
+          <p:nvPr/>
+        </p:nvSpPr>
+        <p:spPr>
+          <a:xfrm>
+            <a:off x="1944515" y="1324052"/>
+            <a:ext cx="1808326" cy="580788"/>
+          </a:xfrm>
+          <a:prstGeom prst="flowChartInputOutput">
+            <a:avLst/>
+          </a:prstGeom>
+          <a:ln>
+            <a:solidFill>
+              <a:schemeClr val="tx1"/>
+            </a:solidFill>
+          </a:ln>
+        </p:spPr>
+        <p:style>
+          <a:lnRef idx="2">
+            <a:schemeClr val="accent6"/>
+          </a:lnRef>
+          <a:fillRef idx="1">
+            <a:schemeClr val="lt1"/>
+          </a:fillRef>
+          <a:effectRef idx="0">
+            <a:schemeClr val="accent6"/>
+          </a:effectRef>
+          <a:fontRef idx="minor">
+            <a:schemeClr val="dk1"/>
+          </a:fontRef>
+        </p:style>
+        <p:txBody>
+          <a:bodyPr rtlCol="0" anchor="ctr"/>
+          <a:lstStyle/>
+          <a:p>
+            <a:pPr algn="ctr"/>
+            <a:r>
+              <a:rPr lang="en-US" sz="1200" err="1">
+                <a:solidFill>
+                  <a:schemeClr val="tx1"/>
+                </a:solidFill>
+                <a:latin typeface="Times New Roman" panose="02020603050405020304" pitchFamily="18" charset="0"/>
+                <a:cs typeface="Times New Roman" panose="02020603050405020304" pitchFamily="18" charset="0"/>
+              </a:rPr>
+              <a:t>Inisialisasi</a:t>
+            </a:r>
+            <a:r>
+              <a:rPr lang="en-US" sz="1200">
+                <a:solidFill>
+                  <a:schemeClr val="tx1"/>
+                </a:solidFill>
+                <a:latin typeface="Times New Roman" panose="02020603050405020304" pitchFamily="18" charset="0"/>
+                <a:cs typeface="Times New Roman" panose="02020603050405020304" pitchFamily="18" charset="0"/>
+              </a:rPr>
+              <a:t> ESP32 dan ESP32 cam</a:t>
+            </a:r>
+          </a:p>
+        </p:txBody>
+      </p:sp>
+      <p:sp>
+        <p:nvSpPr>
+          <p:cNvPr id="7" name="Rectangle 6">
+            <a:extLst>
+              <a:ext uri="{FF2B5EF4-FFF2-40B4-BE49-F238E27FC236}">
+                <a16:creationId xmlns:a16="http://schemas.microsoft.com/office/drawing/2014/main" id="{9CC6BC2D-82E1-A60B-A8F6-7119A8E0C6B0}"/>
+              </a:ext>
+            </a:extLst>
+          </p:cNvPr>
+          <p:cNvSpPr/>
+          <p:nvPr/>
+        </p:nvSpPr>
+        <p:spPr>
+          <a:xfrm>
+            <a:off x="6193638" y="3715779"/>
+            <a:ext cx="1197682" cy="531567"/>
+          </a:xfrm>
+          <a:prstGeom prst="rect">
+            <a:avLst/>
+          </a:prstGeom>
+          <a:noFill/>
+          <a:ln>
+            <a:solidFill>
+              <a:schemeClr val="tx1"/>
+            </a:solidFill>
+          </a:ln>
+        </p:spPr>
+        <p:style>
+          <a:lnRef idx="2">
+            <a:schemeClr val="accent1">
+              <a:shade val="50000"/>
+            </a:schemeClr>
+          </a:lnRef>
+          <a:fillRef idx="1">
+            <a:schemeClr val="accent1"/>
+          </a:fillRef>
+          <a:effectRef idx="0">
+            <a:schemeClr val="accent1"/>
+          </a:effectRef>
+          <a:fontRef idx="minor">
+            <a:schemeClr val="lt1"/>
+          </a:fontRef>
+        </p:style>
+        <p:txBody>
+          <a:bodyPr rtlCol="0" anchor="ctr"/>
+          <a:lstStyle/>
+          <a:p>
+            <a:pPr algn="ctr"/>
+            <a:r>
+              <a:rPr lang="en-US" sz="1200">
+                <a:solidFill>
+                  <a:schemeClr val="tx1"/>
+                </a:solidFill>
+                <a:latin typeface="Times New Roman" panose="02020603050405020304" pitchFamily="18" charset="0"/>
+                <a:cs typeface="Times New Roman" panose="02020603050405020304" pitchFamily="18" charset="0"/>
+              </a:rPr>
+              <a:t>Kotak Terbuka</a:t>
+            </a:r>
+          </a:p>
+        </p:txBody>
+      </p:sp>
+      <p:sp>
+        <p:nvSpPr>
+          <p:cNvPr id="8" name="Diamond 7">
+            <a:extLst>
+              <a:ext uri="{FF2B5EF4-FFF2-40B4-BE49-F238E27FC236}">
+                <a16:creationId xmlns:a16="http://schemas.microsoft.com/office/drawing/2014/main" id="{5CC18420-B724-6D0A-9449-2F91B04C3115}"/>
+              </a:ext>
+            </a:extLst>
+          </p:cNvPr>
+          <p:cNvSpPr/>
+          <p:nvPr/>
+        </p:nvSpPr>
+        <p:spPr>
+          <a:xfrm>
+            <a:off x="2023610" y="2424542"/>
+            <a:ext cx="1633536" cy="770448"/>
+          </a:xfrm>
+          <a:prstGeom prst="diamond">
+            <a:avLst/>
+          </a:prstGeom>
+          <a:noFill/>
+          <a:ln>
+            <a:solidFill>
+              <a:schemeClr val="tx1"/>
+            </a:solidFill>
+          </a:ln>
+        </p:spPr>
+        <p:style>
+          <a:lnRef idx="2">
+            <a:schemeClr val="accent1">
+              <a:shade val="50000"/>
+            </a:schemeClr>
+          </a:lnRef>
+          <a:fillRef idx="1">
+            <a:schemeClr val="accent1"/>
+          </a:fillRef>
+          <a:effectRef idx="0">
+            <a:schemeClr val="accent1"/>
+          </a:effectRef>
+          <a:fontRef idx="minor">
+            <a:schemeClr val="lt1"/>
+          </a:fontRef>
+        </p:style>
+        <p:txBody>
+          <a:bodyPr rtlCol="0" anchor="ctr"/>
+          <a:lstStyle/>
+          <a:p>
+            <a:pPr algn="ctr"/>
+            <a:r>
+              <a:rPr lang="en-US" sz="1200">
+                <a:solidFill>
+                  <a:schemeClr val="tx1"/>
+                </a:solidFill>
+                <a:latin typeface="Times New Roman" panose="02020603050405020304" pitchFamily="18" charset="0"/>
+                <a:cs typeface="Times New Roman" panose="02020603050405020304" pitchFamily="18" charset="0"/>
+              </a:rPr>
+              <a:t>Tap Kartu RFID</a:t>
+            </a:r>
+          </a:p>
+        </p:txBody>
+      </p:sp>
+      <p:sp>
+        <p:nvSpPr>
+          <p:cNvPr id="9" name="Diamond 8">
+            <a:extLst>
+              <a:ext uri="{FF2B5EF4-FFF2-40B4-BE49-F238E27FC236}">
+                <a16:creationId xmlns:a16="http://schemas.microsoft.com/office/drawing/2014/main" id="{89CBE412-910C-A677-0783-3B13A129D8DD}"/>
+              </a:ext>
+            </a:extLst>
+          </p:cNvPr>
+          <p:cNvSpPr/>
+          <p:nvPr/>
+        </p:nvSpPr>
+        <p:spPr>
+          <a:xfrm>
+            <a:off x="1969915" y="3603623"/>
+            <a:ext cx="1720931" cy="770448"/>
+          </a:xfrm>
+          <a:prstGeom prst="diamond">
+            <a:avLst/>
+          </a:prstGeom>
+          <a:noFill/>
+          <a:ln>
+            <a:solidFill>
+              <a:schemeClr val="tx1"/>
+            </a:solidFill>
+          </a:ln>
+        </p:spPr>
+        <p:style>
+          <a:lnRef idx="2">
+            <a:schemeClr val="accent1">
+              <a:shade val="50000"/>
+            </a:schemeClr>
+          </a:lnRef>
+          <a:fillRef idx="1">
+            <a:schemeClr val="accent1"/>
+          </a:fillRef>
+          <a:effectRef idx="0">
+            <a:schemeClr val="accent1"/>
+          </a:effectRef>
+          <a:fontRef idx="minor">
+            <a:schemeClr val="lt1"/>
+          </a:fontRef>
+        </p:style>
+        <p:txBody>
+          <a:bodyPr rtlCol="0" anchor="ctr"/>
+          <a:lstStyle/>
+          <a:p>
+            <a:pPr algn="ctr"/>
+            <a:r>
+              <a:rPr lang="en-US" sz="1200">
+                <a:solidFill>
+                  <a:schemeClr val="tx1"/>
+                </a:solidFill>
+                <a:latin typeface="Times New Roman" panose="02020603050405020304" pitchFamily="18" charset="0"/>
+                <a:cs typeface="Times New Roman" panose="02020603050405020304" pitchFamily="18" charset="0"/>
+              </a:rPr>
+              <a:t>Input Kode Keypad</a:t>
+            </a:r>
+          </a:p>
+        </p:txBody>
+      </p:sp>
+      <p:sp>
+        <p:nvSpPr>
+          <p:cNvPr id="10" name="Diamond 9">
+            <a:extLst>
+              <a:ext uri="{FF2B5EF4-FFF2-40B4-BE49-F238E27FC236}">
+                <a16:creationId xmlns:a16="http://schemas.microsoft.com/office/drawing/2014/main" id="{BE61AF34-FE62-F80D-5F98-CBA98A4231C3}"/>
+              </a:ext>
+            </a:extLst>
+          </p:cNvPr>
+          <p:cNvSpPr/>
+          <p:nvPr/>
+        </p:nvSpPr>
+        <p:spPr>
+          <a:xfrm>
+            <a:off x="2005367" y="4662501"/>
+            <a:ext cx="1633536" cy="770448"/>
+          </a:xfrm>
+          <a:prstGeom prst="diamond">
+            <a:avLst/>
+          </a:prstGeom>
+          <a:noFill/>
+          <a:ln>
+            <a:solidFill>
+              <a:schemeClr val="tx1"/>
+            </a:solidFill>
+          </a:ln>
+        </p:spPr>
+        <p:style>
+          <a:lnRef idx="2">
+            <a:schemeClr val="accent1">
+              <a:shade val="50000"/>
+            </a:schemeClr>
+          </a:lnRef>
+          <a:fillRef idx="1">
+            <a:schemeClr val="accent1"/>
+          </a:fillRef>
+          <a:effectRef idx="0">
+            <a:schemeClr val="accent1"/>
+          </a:effectRef>
+          <a:fontRef idx="minor">
+            <a:schemeClr val="lt1"/>
+          </a:fontRef>
+        </p:style>
+        <p:txBody>
+          <a:bodyPr rtlCol="0" anchor="ctr"/>
+          <a:lstStyle/>
+          <a:p>
+            <a:pPr algn="ctr"/>
+            <a:r>
+              <a:rPr lang="en-US" sz="1200">
+                <a:solidFill>
+                  <a:schemeClr val="tx1"/>
+                </a:solidFill>
+                <a:latin typeface="Times New Roman" panose="02020603050405020304" pitchFamily="18" charset="0"/>
+                <a:cs typeface="Times New Roman" panose="02020603050405020304" pitchFamily="18" charset="0"/>
+              </a:rPr>
+              <a:t>Sensor </a:t>
+            </a:r>
+            <a:r>
+              <a:rPr lang="en-US" sz="1200" err="1">
+                <a:solidFill>
+                  <a:schemeClr val="tx1"/>
+                </a:solidFill>
+                <a:latin typeface="Times New Roman" panose="02020603050405020304" pitchFamily="18" charset="0"/>
+                <a:cs typeface="Times New Roman" panose="02020603050405020304" pitchFamily="18" charset="0"/>
+              </a:rPr>
+              <a:t>Getar</a:t>
+            </a:r>
+            <a:r>
+              <a:rPr lang="en-US" sz="1200">
+                <a:solidFill>
+                  <a:schemeClr val="tx1"/>
+                </a:solidFill>
+                <a:latin typeface="Times New Roman" panose="02020603050405020304" pitchFamily="18" charset="0"/>
+                <a:cs typeface="Times New Roman" panose="02020603050405020304" pitchFamily="18" charset="0"/>
+              </a:rPr>
+              <a:t> </a:t>
+            </a:r>
+            <a:r>
+              <a:rPr lang="en-US" sz="1200" err="1">
+                <a:solidFill>
+                  <a:schemeClr val="tx1"/>
+                </a:solidFill>
+                <a:latin typeface="Times New Roman" panose="02020603050405020304" pitchFamily="18" charset="0"/>
+                <a:cs typeface="Times New Roman" panose="02020603050405020304" pitchFamily="18" charset="0"/>
+              </a:rPr>
+              <a:t>Aktif</a:t>
+            </a:r>
+            <a:endParaRPr lang="en-US" sz="1200">
+              <a:solidFill>
+                <a:schemeClr val="tx1"/>
+              </a:solidFill>
+              <a:latin typeface="Times New Roman" panose="02020603050405020304" pitchFamily="18" charset="0"/>
+              <a:cs typeface="Times New Roman" panose="02020603050405020304" pitchFamily="18" charset="0"/>
+            </a:endParaRPr>
+          </a:p>
+        </p:txBody>
+      </p:sp>
+      <p:cxnSp>
+        <p:nvCxnSpPr>
+          <p:cNvPr id="11" name="Straight Arrow Connector 10">
+            <a:extLst>
+              <a:ext uri="{FF2B5EF4-FFF2-40B4-BE49-F238E27FC236}">
+                <a16:creationId xmlns:a16="http://schemas.microsoft.com/office/drawing/2014/main" id="{7339D5B5-F832-F915-18DB-5FF3CD1C2C87}"/>
+              </a:ext>
+            </a:extLst>
+          </p:cNvPr>
+          <p:cNvCxnSpPr>
+            <a:cxnSpLocks/>
+            <a:stCxn id="9" idx="2"/>
+            <a:endCxn id="10" idx="0"/>
+          </p:cNvCxnSpPr>
+          <p:nvPr/>
+        </p:nvCxnSpPr>
+        <p:spPr>
+          <a:xfrm flipH="1">
+            <a:off x="2822135" y="4374071"/>
+            <a:ext cx="8246" cy="288430"/>
+          </a:xfrm>
+          <a:prstGeom prst="straightConnector1">
+            <a:avLst/>
+          </a:prstGeom>
+          <a:ln w="12700">
+            <a:solidFill>
+              <a:schemeClr val="tx1"/>
+            </a:solidFill>
+            <a:tailEnd type="triangle"/>
+          </a:ln>
+        </p:spPr>
+        <p:style>
+          <a:lnRef idx="1">
+            <a:schemeClr val="accent1"/>
+          </a:lnRef>
+          <a:fillRef idx="0">
+            <a:schemeClr val="accent1"/>
+          </a:fillRef>
+          <a:effectRef idx="0">
+            <a:schemeClr val="accent1"/>
+          </a:effectRef>
+          <a:fontRef idx="minor">
+            <a:schemeClr val="tx1"/>
+          </a:fontRef>
+        </p:style>
+      </p:cxnSp>
+      <p:sp>
+        <p:nvSpPr>
+          <p:cNvPr id="14" name="Diamond 13">
+            <a:extLst>
+              <a:ext uri="{FF2B5EF4-FFF2-40B4-BE49-F238E27FC236}">
+                <a16:creationId xmlns:a16="http://schemas.microsoft.com/office/drawing/2014/main" id="{C3AC8489-6DDC-C421-C88F-394ECEE02185}"/>
+              </a:ext>
+            </a:extLst>
+          </p:cNvPr>
+          <p:cNvSpPr/>
+          <p:nvPr/>
+        </p:nvSpPr>
+        <p:spPr>
+          <a:xfrm>
+            <a:off x="4125474" y="2417565"/>
+            <a:ext cx="1633536" cy="770448"/>
+          </a:xfrm>
+          <a:prstGeom prst="diamond">
+            <a:avLst/>
+          </a:prstGeom>
+          <a:noFill/>
+          <a:ln>
+            <a:solidFill>
+              <a:schemeClr val="tx1"/>
+            </a:solidFill>
+          </a:ln>
+        </p:spPr>
+        <p:style>
+          <a:lnRef idx="2">
+            <a:schemeClr val="accent1">
+              <a:shade val="50000"/>
+            </a:schemeClr>
+          </a:lnRef>
+          <a:fillRef idx="1">
+            <a:schemeClr val="accent1"/>
+          </a:fillRef>
+          <a:effectRef idx="0">
+            <a:schemeClr val="accent1"/>
+          </a:effectRef>
+          <a:fontRef idx="minor">
+            <a:schemeClr val="lt1"/>
+          </a:fontRef>
+        </p:style>
+        <p:txBody>
+          <a:bodyPr rtlCol="0" anchor="ctr"/>
+          <a:lstStyle/>
+          <a:p>
+            <a:pPr algn="ctr"/>
+            <a:r>
+              <a:rPr lang="en-US" sz="1200">
+                <a:solidFill>
+                  <a:schemeClr val="tx1"/>
+                </a:solidFill>
+                <a:latin typeface="Times New Roman" panose="02020603050405020304" pitchFamily="18" charset="0"/>
+                <a:cs typeface="Times New Roman" panose="02020603050405020304" pitchFamily="18" charset="0"/>
+              </a:rPr>
+              <a:t>Kartu valid</a:t>
+            </a:r>
+          </a:p>
+        </p:txBody>
+      </p:sp>
+      <p:sp>
+        <p:nvSpPr>
+          <p:cNvPr id="15" name="TextBox 14">
+            <a:extLst>
+              <a:ext uri="{FF2B5EF4-FFF2-40B4-BE49-F238E27FC236}">
+                <a16:creationId xmlns:a16="http://schemas.microsoft.com/office/drawing/2014/main" id="{7E3BE96D-DFD8-CD90-0547-9B792F21332C}"/>
+              </a:ext>
+            </a:extLst>
+          </p:cNvPr>
+          <p:cNvSpPr txBox="1"/>
+          <p:nvPr/>
+        </p:nvSpPr>
+        <p:spPr>
+          <a:xfrm>
+            <a:off x="2329374" y="4332194"/>
+            <a:ext cx="518161" cy="276999"/>
+          </a:xfrm>
+          <a:prstGeom prst="rect">
+            <a:avLst/>
+          </a:prstGeom>
+          <a:noFill/>
+        </p:spPr>
+        <p:txBody>
+          <a:bodyPr wrap="square" rtlCol="0">
+            <a:spAutoFit/>
+          </a:bodyPr>
+          <a:lstStyle/>
+          <a:p>
+            <a:r>
+              <a:rPr lang="en-US" sz="1200" err="1">
+                <a:latin typeface="Times New Roman" panose="02020603050405020304" pitchFamily="18" charset="0"/>
+                <a:cs typeface="Times New Roman" panose="02020603050405020304" pitchFamily="18" charset="0"/>
+              </a:rPr>
+              <a:t>tidak</a:t>
+            </a:r>
+            <a:endParaRPr lang="en-US" sz="1200">
+              <a:latin typeface="Times New Roman" panose="02020603050405020304" pitchFamily="18" charset="0"/>
+              <a:cs typeface="Times New Roman" panose="02020603050405020304" pitchFamily="18" charset="0"/>
+            </a:endParaRPr>
+          </a:p>
+        </p:txBody>
+      </p:sp>
+      <p:cxnSp>
+        <p:nvCxnSpPr>
+          <p:cNvPr id="16" name="Straight Arrow Connector 15">
+            <a:extLst>
+              <a:ext uri="{FF2B5EF4-FFF2-40B4-BE49-F238E27FC236}">
+                <a16:creationId xmlns:a16="http://schemas.microsoft.com/office/drawing/2014/main" id="{62B9DF65-6EE2-E2A2-C474-2FDFAD9C9153}"/>
+              </a:ext>
+            </a:extLst>
+          </p:cNvPr>
+          <p:cNvCxnSpPr>
+            <a:cxnSpLocks/>
+            <a:stCxn id="8" idx="3"/>
+            <a:endCxn id="14" idx="1"/>
+          </p:cNvCxnSpPr>
+          <p:nvPr/>
+        </p:nvCxnSpPr>
+        <p:spPr>
+          <a:xfrm flipV="1">
+            <a:off x="3657146" y="2802789"/>
+            <a:ext cx="468328" cy="6977"/>
+          </a:xfrm>
+          <a:prstGeom prst="straightConnector1">
+            <a:avLst/>
+          </a:prstGeom>
+          <a:ln w="12700">
+            <a:solidFill>
+              <a:schemeClr val="tx1"/>
+            </a:solidFill>
+            <a:tailEnd type="triangle"/>
+          </a:ln>
+        </p:spPr>
+        <p:style>
+          <a:lnRef idx="1">
+            <a:schemeClr val="accent1"/>
+          </a:lnRef>
+          <a:fillRef idx="0">
+            <a:schemeClr val="accent1"/>
+          </a:fillRef>
+          <a:effectRef idx="0">
+            <a:schemeClr val="accent1"/>
+          </a:effectRef>
+          <a:fontRef idx="minor">
+            <a:schemeClr val="tx1"/>
+          </a:fontRef>
+        </p:style>
+      </p:cxnSp>
+      <p:sp>
+        <p:nvSpPr>
+          <p:cNvPr id="20" name="Diamond 19">
+            <a:extLst>
+              <a:ext uri="{FF2B5EF4-FFF2-40B4-BE49-F238E27FC236}">
+                <a16:creationId xmlns:a16="http://schemas.microsoft.com/office/drawing/2014/main" id="{8487C15E-54B6-1144-E3DD-B6D849B7C605}"/>
+              </a:ext>
+            </a:extLst>
+          </p:cNvPr>
+          <p:cNvSpPr/>
+          <p:nvPr/>
+        </p:nvSpPr>
+        <p:spPr>
+          <a:xfrm>
+            <a:off x="4115949" y="3599357"/>
+            <a:ext cx="1633536" cy="770448"/>
+          </a:xfrm>
+          <a:prstGeom prst="diamond">
+            <a:avLst/>
+          </a:prstGeom>
+          <a:noFill/>
+          <a:ln>
+            <a:solidFill>
+              <a:schemeClr val="tx1"/>
+            </a:solidFill>
+          </a:ln>
+        </p:spPr>
+        <p:style>
+          <a:lnRef idx="2">
+            <a:schemeClr val="accent1">
+              <a:shade val="50000"/>
+            </a:schemeClr>
+          </a:lnRef>
+          <a:fillRef idx="1">
+            <a:schemeClr val="accent1"/>
+          </a:fillRef>
+          <a:effectRef idx="0">
+            <a:schemeClr val="accent1"/>
+          </a:effectRef>
+          <a:fontRef idx="minor">
+            <a:schemeClr val="lt1"/>
+          </a:fontRef>
+        </p:style>
+        <p:txBody>
+          <a:bodyPr rtlCol="0" anchor="ctr"/>
+          <a:lstStyle/>
+          <a:p>
+            <a:pPr algn="ctr"/>
+            <a:r>
+              <a:rPr lang="en-US" sz="1200">
+                <a:solidFill>
+                  <a:schemeClr val="tx1"/>
+                </a:solidFill>
+                <a:latin typeface="Times New Roman" panose="02020603050405020304" pitchFamily="18" charset="0"/>
+                <a:cs typeface="Times New Roman" panose="02020603050405020304" pitchFamily="18" charset="0"/>
+              </a:rPr>
+              <a:t>Kode </a:t>
+            </a:r>
+            <a:r>
+              <a:rPr lang="en-US" sz="1200" err="1">
+                <a:solidFill>
+                  <a:schemeClr val="tx1"/>
+                </a:solidFill>
+                <a:latin typeface="Times New Roman" panose="02020603050405020304" pitchFamily="18" charset="0"/>
+                <a:cs typeface="Times New Roman" panose="02020603050405020304" pitchFamily="18" charset="0"/>
+              </a:rPr>
+              <a:t>Benar</a:t>
+            </a:r>
+            <a:endParaRPr lang="en-US" sz="1200">
+              <a:solidFill>
+                <a:schemeClr val="tx1"/>
+              </a:solidFill>
+              <a:latin typeface="Times New Roman" panose="02020603050405020304" pitchFamily="18" charset="0"/>
+              <a:cs typeface="Times New Roman" panose="02020603050405020304" pitchFamily="18" charset="0"/>
+            </a:endParaRPr>
+          </a:p>
+        </p:txBody>
+      </p:sp>
+      <p:cxnSp>
+        <p:nvCxnSpPr>
+          <p:cNvPr id="23" name="Straight Arrow Connector 22">
+            <a:extLst>
+              <a:ext uri="{FF2B5EF4-FFF2-40B4-BE49-F238E27FC236}">
+                <a16:creationId xmlns:a16="http://schemas.microsoft.com/office/drawing/2014/main" id="{6313FC9B-E661-C258-2A54-D5DED7F75AB8}"/>
+              </a:ext>
+            </a:extLst>
+          </p:cNvPr>
+          <p:cNvCxnSpPr>
+            <a:cxnSpLocks/>
+            <a:endCxn id="7" idx="0"/>
+          </p:cNvCxnSpPr>
+          <p:nvPr/>
+        </p:nvCxnSpPr>
+        <p:spPr>
+          <a:xfrm>
+            <a:off x="6792479" y="2802789"/>
+            <a:ext cx="0" cy="912990"/>
+          </a:xfrm>
+          <a:prstGeom prst="straightConnector1">
+            <a:avLst/>
+          </a:prstGeom>
+          <a:ln w="12700">
+            <a:solidFill>
+              <a:schemeClr val="tx1"/>
+            </a:solidFill>
+            <a:tailEnd type="triangle"/>
+          </a:ln>
+        </p:spPr>
+        <p:style>
+          <a:lnRef idx="1">
+            <a:schemeClr val="accent1"/>
+          </a:lnRef>
+          <a:fillRef idx="0">
+            <a:schemeClr val="accent1"/>
+          </a:fillRef>
+          <a:effectRef idx="0">
+            <a:schemeClr val="accent1"/>
+          </a:effectRef>
+          <a:fontRef idx="minor">
+            <a:schemeClr val="tx1"/>
+          </a:fontRef>
+        </p:style>
+      </p:cxnSp>
+      <p:cxnSp>
+        <p:nvCxnSpPr>
+          <p:cNvPr id="26" name="Straight Arrow Connector 25">
+            <a:extLst>
+              <a:ext uri="{FF2B5EF4-FFF2-40B4-BE49-F238E27FC236}">
+                <a16:creationId xmlns:a16="http://schemas.microsoft.com/office/drawing/2014/main" id="{90591AC6-E745-BC39-38D1-AF8AC2E89FF4}"/>
+              </a:ext>
+            </a:extLst>
+          </p:cNvPr>
+          <p:cNvCxnSpPr>
+            <a:cxnSpLocks/>
+            <a:stCxn id="20" idx="3"/>
+            <a:endCxn id="7" idx="1"/>
+          </p:cNvCxnSpPr>
+          <p:nvPr/>
+        </p:nvCxnSpPr>
+        <p:spPr>
+          <a:xfrm flipV="1">
+            <a:off x="5749485" y="3981563"/>
+            <a:ext cx="444153" cy="3018"/>
+          </a:xfrm>
+          <a:prstGeom prst="straightConnector1">
+            <a:avLst/>
+          </a:prstGeom>
+          <a:ln w="12700">
+            <a:solidFill>
+              <a:schemeClr val="tx1"/>
+            </a:solidFill>
+            <a:tailEnd type="triangle"/>
+          </a:ln>
+        </p:spPr>
+        <p:style>
+          <a:lnRef idx="1">
+            <a:schemeClr val="accent1"/>
+          </a:lnRef>
+          <a:fillRef idx="0">
+            <a:schemeClr val="accent1"/>
+          </a:fillRef>
+          <a:effectRef idx="0">
+            <a:schemeClr val="accent1"/>
+          </a:effectRef>
+          <a:fontRef idx="minor">
+            <a:schemeClr val="tx1"/>
+          </a:fontRef>
+        </p:style>
+      </p:cxnSp>
+      <p:cxnSp>
+        <p:nvCxnSpPr>
+          <p:cNvPr id="29" name="Straight Connector 28">
+            <a:extLst>
+              <a:ext uri="{FF2B5EF4-FFF2-40B4-BE49-F238E27FC236}">
+                <a16:creationId xmlns:a16="http://schemas.microsoft.com/office/drawing/2014/main" id="{5565732B-7F22-08A5-5D5D-67E1A7D6FB4E}"/>
+              </a:ext>
+            </a:extLst>
+          </p:cNvPr>
+          <p:cNvCxnSpPr>
+            <a:cxnSpLocks/>
+            <a:stCxn id="14" idx="3"/>
+          </p:cNvCxnSpPr>
+          <p:nvPr/>
+        </p:nvCxnSpPr>
+        <p:spPr>
+          <a:xfrm>
+            <a:off x="5759010" y="2802789"/>
+            <a:ext cx="1033469" cy="0"/>
+          </a:xfrm>
+          <a:prstGeom prst="line">
+            <a:avLst/>
+          </a:prstGeom>
+          <a:ln w="12700">
+            <a:solidFill>
+              <a:schemeClr val="tx1"/>
+            </a:solidFill>
+          </a:ln>
+        </p:spPr>
+        <p:style>
+          <a:lnRef idx="1">
+            <a:schemeClr val="accent1"/>
+          </a:lnRef>
+          <a:fillRef idx="0">
+            <a:schemeClr val="accent1"/>
+          </a:fillRef>
+          <a:effectRef idx="0">
+            <a:schemeClr val="accent1"/>
+          </a:effectRef>
+          <a:fontRef idx="minor">
+            <a:schemeClr val="tx1"/>
+          </a:fontRef>
+        </p:style>
+      </p:cxnSp>
+      <p:cxnSp>
+        <p:nvCxnSpPr>
+          <p:cNvPr id="33" name="Straight Arrow Connector 32">
+            <a:extLst>
+              <a:ext uri="{FF2B5EF4-FFF2-40B4-BE49-F238E27FC236}">
+                <a16:creationId xmlns:a16="http://schemas.microsoft.com/office/drawing/2014/main" id="{388003A8-9EC9-F3FD-D13B-7A0A47673106}"/>
+              </a:ext>
+            </a:extLst>
+          </p:cNvPr>
+          <p:cNvCxnSpPr>
+            <a:cxnSpLocks/>
+            <a:stCxn id="9" idx="3"/>
+            <a:endCxn id="20" idx="1"/>
+          </p:cNvCxnSpPr>
+          <p:nvPr/>
+        </p:nvCxnSpPr>
+        <p:spPr>
+          <a:xfrm flipV="1">
+            <a:off x="3690846" y="3984581"/>
+            <a:ext cx="425103" cy="4266"/>
+          </a:xfrm>
+          <a:prstGeom prst="straightConnector1">
+            <a:avLst/>
+          </a:prstGeom>
+          <a:ln w="12700">
+            <a:solidFill>
+              <a:schemeClr val="tx1"/>
+            </a:solidFill>
+            <a:tailEnd type="triangle"/>
+          </a:ln>
+        </p:spPr>
+        <p:style>
+          <a:lnRef idx="1">
+            <a:schemeClr val="accent1"/>
+          </a:lnRef>
+          <a:fillRef idx="0">
+            <a:schemeClr val="accent1"/>
+          </a:fillRef>
+          <a:effectRef idx="0">
+            <a:schemeClr val="accent1"/>
+          </a:effectRef>
+          <a:fontRef idx="minor">
+            <a:schemeClr val="tx1"/>
+          </a:fontRef>
+        </p:style>
+      </p:cxnSp>
+      <p:sp>
+        <p:nvSpPr>
+          <p:cNvPr id="36" name="Rectangle 35">
+            <a:extLst>
+              <a:ext uri="{FF2B5EF4-FFF2-40B4-BE49-F238E27FC236}">
+                <a16:creationId xmlns:a16="http://schemas.microsoft.com/office/drawing/2014/main" id="{40F4D110-4348-FF9D-0EAA-BB0997C47107}"/>
+              </a:ext>
+            </a:extLst>
+          </p:cNvPr>
+          <p:cNvSpPr/>
+          <p:nvPr/>
+        </p:nvSpPr>
+        <p:spPr>
+          <a:xfrm>
+            <a:off x="6200555" y="4743841"/>
+            <a:ext cx="1197682" cy="607767"/>
+          </a:xfrm>
+          <a:prstGeom prst="rect">
+            <a:avLst/>
+          </a:prstGeom>
+          <a:noFill/>
+          <a:ln>
+            <a:solidFill>
+              <a:schemeClr val="tx1"/>
+            </a:solidFill>
+          </a:ln>
+        </p:spPr>
+        <p:style>
+          <a:lnRef idx="2">
+            <a:schemeClr val="accent1">
+              <a:shade val="50000"/>
+            </a:schemeClr>
+          </a:lnRef>
+          <a:fillRef idx="1">
+            <a:schemeClr val="accent1"/>
+          </a:fillRef>
+          <a:effectRef idx="0">
+            <a:schemeClr val="accent1"/>
+          </a:effectRef>
+          <a:fontRef idx="minor">
+            <a:schemeClr val="lt1"/>
+          </a:fontRef>
+        </p:style>
+        <p:txBody>
+          <a:bodyPr rtlCol="0" anchor="ctr"/>
+          <a:lstStyle/>
+          <a:p>
+            <a:pPr algn="ctr"/>
+            <a:r>
+              <a:rPr lang="en-US" sz="1200" err="1">
+                <a:solidFill>
+                  <a:schemeClr val="tx1"/>
+                </a:solidFill>
+                <a:latin typeface="Times New Roman" panose="02020603050405020304" pitchFamily="18" charset="0"/>
+                <a:cs typeface="Times New Roman" panose="02020603050405020304" pitchFamily="18" charset="0"/>
+              </a:rPr>
+              <a:t>Mengirimkan</a:t>
+            </a:r>
+            <a:r>
+              <a:rPr lang="en-US" sz="1200">
+                <a:solidFill>
+                  <a:schemeClr val="tx1"/>
+                </a:solidFill>
+                <a:latin typeface="Times New Roman" panose="02020603050405020304" pitchFamily="18" charset="0"/>
+                <a:cs typeface="Times New Roman" panose="02020603050405020304" pitchFamily="18" charset="0"/>
+              </a:rPr>
+              <a:t> </a:t>
+            </a:r>
+            <a:r>
+              <a:rPr lang="en-US" sz="1200" err="1">
+                <a:solidFill>
+                  <a:schemeClr val="tx1"/>
+                </a:solidFill>
+                <a:latin typeface="Times New Roman" panose="02020603050405020304" pitchFamily="18" charset="0"/>
+                <a:cs typeface="Times New Roman" panose="02020603050405020304" pitchFamily="18" charset="0"/>
+              </a:rPr>
+              <a:t>Notifikasi</a:t>
+            </a:r>
+            <a:r>
+              <a:rPr lang="en-US" sz="1200">
+                <a:solidFill>
+                  <a:schemeClr val="tx1"/>
+                </a:solidFill>
+                <a:latin typeface="Times New Roman" panose="02020603050405020304" pitchFamily="18" charset="0"/>
+                <a:cs typeface="Times New Roman" panose="02020603050405020304" pitchFamily="18" charset="0"/>
+              </a:rPr>
+              <a:t> ke Blynk</a:t>
+            </a:r>
+          </a:p>
+        </p:txBody>
+      </p:sp>
+      <p:cxnSp>
+        <p:nvCxnSpPr>
+          <p:cNvPr id="49" name="Straight Arrow Connector 48">
+            <a:extLst>
+              <a:ext uri="{FF2B5EF4-FFF2-40B4-BE49-F238E27FC236}">
+                <a16:creationId xmlns:a16="http://schemas.microsoft.com/office/drawing/2014/main" id="{461F1471-8D74-A212-E485-141CF6959B4B}"/>
+              </a:ext>
+            </a:extLst>
+          </p:cNvPr>
+          <p:cNvCxnSpPr>
+            <a:cxnSpLocks/>
+            <a:stCxn id="7" idx="2"/>
+            <a:endCxn id="36" idx="0"/>
+          </p:cNvCxnSpPr>
+          <p:nvPr/>
+        </p:nvCxnSpPr>
+        <p:spPr>
+          <a:xfrm>
+            <a:off x="6792479" y="4247346"/>
+            <a:ext cx="6917" cy="496495"/>
+          </a:xfrm>
+          <a:prstGeom prst="straightConnector1">
+            <a:avLst/>
+          </a:prstGeom>
+          <a:ln w="12700">
+            <a:solidFill>
+              <a:schemeClr val="tx1"/>
+            </a:solidFill>
+            <a:tailEnd type="triangle"/>
+          </a:ln>
+        </p:spPr>
+        <p:style>
+          <a:lnRef idx="1">
+            <a:schemeClr val="accent1"/>
+          </a:lnRef>
+          <a:fillRef idx="0">
+            <a:schemeClr val="accent1"/>
+          </a:fillRef>
+          <a:effectRef idx="0">
+            <a:schemeClr val="accent1"/>
+          </a:effectRef>
+          <a:fontRef idx="minor">
+            <a:schemeClr val="tx1"/>
+          </a:fontRef>
+        </p:style>
+      </p:cxnSp>
+      <p:sp>
+        <p:nvSpPr>
+          <p:cNvPr id="52" name="Rectangle 51">
+            <a:extLst>
+              <a:ext uri="{FF2B5EF4-FFF2-40B4-BE49-F238E27FC236}">
+                <a16:creationId xmlns:a16="http://schemas.microsoft.com/office/drawing/2014/main" id="{5E4D028F-B1DB-E959-209C-58AAAD665C88}"/>
+              </a:ext>
+            </a:extLst>
+          </p:cNvPr>
+          <p:cNvSpPr/>
+          <p:nvPr/>
+        </p:nvSpPr>
+        <p:spPr>
+          <a:xfrm>
+            <a:off x="4343401" y="4786121"/>
+            <a:ext cx="1197682" cy="531567"/>
+          </a:xfrm>
+          <a:prstGeom prst="rect">
+            <a:avLst/>
+          </a:prstGeom>
+          <a:noFill/>
+          <a:ln>
+            <a:solidFill>
+              <a:schemeClr val="tx1"/>
+            </a:solidFill>
+          </a:ln>
+        </p:spPr>
+        <p:style>
+          <a:lnRef idx="2">
+            <a:schemeClr val="accent1">
+              <a:shade val="50000"/>
+            </a:schemeClr>
+          </a:lnRef>
+          <a:fillRef idx="1">
+            <a:schemeClr val="accent1"/>
+          </a:fillRef>
+          <a:effectRef idx="0">
+            <a:schemeClr val="accent1"/>
+          </a:effectRef>
+          <a:fontRef idx="minor">
+            <a:schemeClr val="lt1"/>
+          </a:fontRef>
+        </p:style>
+        <p:txBody>
+          <a:bodyPr rtlCol="0" anchor="ctr"/>
+          <a:lstStyle/>
+          <a:p>
+            <a:pPr algn="ctr"/>
+            <a:r>
+              <a:rPr lang="en-US" sz="1200">
+                <a:solidFill>
+                  <a:schemeClr val="tx1"/>
+                </a:solidFill>
+                <a:latin typeface="Times New Roman" panose="02020603050405020304" pitchFamily="18" charset="0"/>
+                <a:cs typeface="Times New Roman" panose="02020603050405020304" pitchFamily="18" charset="0"/>
+              </a:rPr>
+              <a:t>ESP cam take Photo</a:t>
+            </a:r>
+          </a:p>
+        </p:txBody>
+      </p:sp>
+      <p:cxnSp>
+        <p:nvCxnSpPr>
+          <p:cNvPr id="53" name="Straight Arrow Connector 52">
+            <a:extLst>
+              <a:ext uri="{FF2B5EF4-FFF2-40B4-BE49-F238E27FC236}">
+                <a16:creationId xmlns:a16="http://schemas.microsoft.com/office/drawing/2014/main" id="{C7653A59-23D8-1B51-4A7C-ACBEEBFB77A4}"/>
+              </a:ext>
+            </a:extLst>
+          </p:cNvPr>
+          <p:cNvCxnSpPr>
+            <a:cxnSpLocks/>
+            <a:stCxn id="8" idx="2"/>
+            <a:endCxn id="9" idx="0"/>
+          </p:cNvCxnSpPr>
+          <p:nvPr/>
+        </p:nvCxnSpPr>
+        <p:spPr>
+          <a:xfrm flipH="1">
+            <a:off x="2830381" y="3194990"/>
+            <a:ext cx="9997" cy="408633"/>
+          </a:xfrm>
+          <a:prstGeom prst="straightConnector1">
+            <a:avLst/>
+          </a:prstGeom>
+          <a:ln w="12700">
+            <a:solidFill>
+              <a:schemeClr val="tx1"/>
+            </a:solidFill>
+            <a:tailEnd type="triangle"/>
+          </a:ln>
+        </p:spPr>
+        <p:style>
+          <a:lnRef idx="1">
+            <a:schemeClr val="accent1"/>
+          </a:lnRef>
+          <a:fillRef idx="0">
+            <a:schemeClr val="accent1"/>
+          </a:fillRef>
+          <a:effectRef idx="0">
+            <a:schemeClr val="accent1"/>
+          </a:effectRef>
+          <a:fontRef idx="minor">
+            <a:schemeClr val="tx1"/>
+          </a:fontRef>
+        </p:style>
+      </p:cxnSp>
+      <p:cxnSp>
+        <p:nvCxnSpPr>
+          <p:cNvPr id="60" name="Straight Arrow Connector 59">
+            <a:extLst>
+              <a:ext uri="{FF2B5EF4-FFF2-40B4-BE49-F238E27FC236}">
+                <a16:creationId xmlns:a16="http://schemas.microsoft.com/office/drawing/2014/main" id="{71E61324-B251-3705-73CB-C3CC287D7A1D}"/>
+              </a:ext>
+            </a:extLst>
+          </p:cNvPr>
+          <p:cNvCxnSpPr>
+            <a:cxnSpLocks/>
+            <a:stCxn id="6" idx="4"/>
+            <a:endCxn id="8" idx="0"/>
+          </p:cNvCxnSpPr>
+          <p:nvPr/>
+        </p:nvCxnSpPr>
+        <p:spPr>
+          <a:xfrm flipH="1">
+            <a:off x="2840378" y="1904840"/>
+            <a:ext cx="8300" cy="519702"/>
+          </a:xfrm>
+          <a:prstGeom prst="straightConnector1">
+            <a:avLst/>
+          </a:prstGeom>
+          <a:ln w="12700">
+            <a:solidFill>
+              <a:schemeClr val="tx1"/>
+            </a:solidFill>
+            <a:tailEnd type="triangle"/>
+          </a:ln>
+        </p:spPr>
+        <p:style>
+          <a:lnRef idx="1">
+            <a:schemeClr val="accent1"/>
+          </a:lnRef>
+          <a:fillRef idx="0">
+            <a:schemeClr val="accent1"/>
+          </a:fillRef>
+          <a:effectRef idx="0">
+            <a:schemeClr val="accent1"/>
+          </a:effectRef>
+          <a:fontRef idx="minor">
+            <a:schemeClr val="tx1"/>
+          </a:fontRef>
+        </p:style>
+      </p:cxnSp>
+      <p:cxnSp>
+        <p:nvCxnSpPr>
+          <p:cNvPr id="63" name="Straight Arrow Connector 62">
+            <a:extLst>
+              <a:ext uri="{FF2B5EF4-FFF2-40B4-BE49-F238E27FC236}">
+                <a16:creationId xmlns:a16="http://schemas.microsoft.com/office/drawing/2014/main" id="{B8878F17-B80A-2350-6E13-4B3D9FC6BEA4}"/>
+              </a:ext>
+            </a:extLst>
+          </p:cNvPr>
+          <p:cNvCxnSpPr>
+            <a:cxnSpLocks/>
+            <a:stCxn id="4" idx="4"/>
+            <a:endCxn id="6" idx="1"/>
+          </p:cNvCxnSpPr>
+          <p:nvPr/>
+        </p:nvCxnSpPr>
+        <p:spPr>
+          <a:xfrm>
+            <a:off x="2847535" y="1145540"/>
+            <a:ext cx="1143" cy="178512"/>
+          </a:xfrm>
+          <a:prstGeom prst="straightConnector1">
+            <a:avLst/>
+          </a:prstGeom>
+          <a:ln w="12700">
+            <a:solidFill>
+              <a:schemeClr val="tx1"/>
+            </a:solidFill>
+            <a:tailEnd type="triangle"/>
+          </a:ln>
+        </p:spPr>
+        <p:style>
+          <a:lnRef idx="1">
+            <a:schemeClr val="accent1"/>
+          </a:lnRef>
+          <a:fillRef idx="0">
+            <a:schemeClr val="accent1"/>
+          </a:fillRef>
+          <a:effectRef idx="0">
+            <a:schemeClr val="accent1"/>
+          </a:effectRef>
+          <a:fontRef idx="minor">
+            <a:schemeClr val="tx1"/>
+          </a:fontRef>
+        </p:style>
+      </p:cxnSp>
+      <p:sp>
+        <p:nvSpPr>
+          <p:cNvPr id="67" name="Oval 66">
+            <a:extLst>
+              <a:ext uri="{FF2B5EF4-FFF2-40B4-BE49-F238E27FC236}">
+                <a16:creationId xmlns:a16="http://schemas.microsoft.com/office/drawing/2014/main" id="{9F09615B-2FA1-CC7F-7431-F97B985E5DEB}"/>
+              </a:ext>
+            </a:extLst>
+          </p:cNvPr>
+          <p:cNvSpPr/>
+          <p:nvPr/>
+        </p:nvSpPr>
+        <p:spPr>
+          <a:xfrm>
+            <a:off x="6154615" y="5675678"/>
+            <a:ext cx="1280160" cy="445087"/>
+          </a:xfrm>
+          <a:prstGeom prst="ellipse">
+            <a:avLst/>
+          </a:prstGeom>
+          <a:ln>
+            <a:solidFill>
+              <a:schemeClr val="tx1"/>
+            </a:solidFill>
+          </a:ln>
+        </p:spPr>
+        <p:style>
+          <a:lnRef idx="2">
+            <a:schemeClr val="accent6"/>
+          </a:lnRef>
+          <a:fillRef idx="1">
+            <a:schemeClr val="lt1"/>
+          </a:fillRef>
+          <a:effectRef idx="0">
+            <a:schemeClr val="accent6"/>
+          </a:effectRef>
+          <a:fontRef idx="minor">
+            <a:schemeClr val="dk1"/>
+          </a:fontRef>
+        </p:style>
+        <p:txBody>
+          <a:bodyPr rtlCol="0" anchor="ctr"/>
+          <a:lstStyle/>
+          <a:p>
+            <a:pPr algn="ctr"/>
+            <a:r>
+              <a:rPr lang="en-US" sz="1400" err="1"/>
+              <a:t>Selesai</a:t>
+            </a:r>
+            <a:endParaRPr lang="en-ID"/>
+          </a:p>
+        </p:txBody>
+      </p:sp>
+      <p:cxnSp>
+        <p:nvCxnSpPr>
+          <p:cNvPr id="68" name="Straight Arrow Connector 67">
+            <a:extLst>
+              <a:ext uri="{FF2B5EF4-FFF2-40B4-BE49-F238E27FC236}">
+                <a16:creationId xmlns:a16="http://schemas.microsoft.com/office/drawing/2014/main" id="{1B058DB2-CD2B-888C-466F-8FA29DB4823A}"/>
+              </a:ext>
+            </a:extLst>
+          </p:cNvPr>
+          <p:cNvCxnSpPr>
+            <a:cxnSpLocks/>
+            <a:stCxn id="36" idx="2"/>
+            <a:endCxn id="67" idx="0"/>
+          </p:cNvCxnSpPr>
+          <p:nvPr/>
+        </p:nvCxnSpPr>
+        <p:spPr>
+          <a:xfrm flipH="1">
+            <a:off x="6794695" y="5351608"/>
+            <a:ext cx="4701" cy="324070"/>
+          </a:xfrm>
+          <a:prstGeom prst="straightConnector1">
+            <a:avLst/>
+          </a:prstGeom>
+          <a:ln w="12700">
+            <a:solidFill>
+              <a:schemeClr val="tx1"/>
+            </a:solidFill>
+            <a:tailEnd type="triangle"/>
+          </a:ln>
+        </p:spPr>
+        <p:style>
+          <a:lnRef idx="1">
+            <a:schemeClr val="accent1"/>
+          </a:lnRef>
+          <a:fillRef idx="0">
+            <a:schemeClr val="accent1"/>
+          </a:fillRef>
+          <a:effectRef idx="0">
+            <a:schemeClr val="accent1"/>
+          </a:effectRef>
+          <a:fontRef idx="minor">
+            <a:schemeClr val="tx1"/>
+          </a:fontRef>
+        </p:style>
+      </p:cxnSp>
+      <p:cxnSp>
+        <p:nvCxnSpPr>
+          <p:cNvPr id="72" name="Straight Arrow Connector 71">
+            <a:extLst>
+              <a:ext uri="{FF2B5EF4-FFF2-40B4-BE49-F238E27FC236}">
+                <a16:creationId xmlns:a16="http://schemas.microsoft.com/office/drawing/2014/main" id="{B9C229B3-6077-EB2C-323F-EEF4902BD3FC}"/>
+              </a:ext>
+            </a:extLst>
+          </p:cNvPr>
+          <p:cNvCxnSpPr>
+            <a:cxnSpLocks/>
+            <a:stCxn id="10" idx="3"/>
+            <a:endCxn id="52" idx="1"/>
+          </p:cNvCxnSpPr>
+          <p:nvPr/>
+        </p:nvCxnSpPr>
+        <p:spPr>
+          <a:xfrm>
+            <a:off x="3638903" y="5047725"/>
+            <a:ext cx="704498" cy="4180"/>
+          </a:xfrm>
+          <a:prstGeom prst="straightConnector1">
+            <a:avLst/>
+          </a:prstGeom>
+          <a:ln w="12700">
+            <a:solidFill>
+              <a:schemeClr val="tx1"/>
+            </a:solidFill>
+            <a:tailEnd type="triangle"/>
+          </a:ln>
+        </p:spPr>
+        <p:style>
+          <a:lnRef idx="1">
+            <a:schemeClr val="accent1"/>
+          </a:lnRef>
+          <a:fillRef idx="0">
+            <a:schemeClr val="accent1"/>
+          </a:fillRef>
+          <a:effectRef idx="0">
+            <a:schemeClr val="accent1"/>
+          </a:effectRef>
+          <a:fontRef idx="minor">
+            <a:schemeClr val="tx1"/>
+          </a:fontRef>
+        </p:style>
+      </p:cxnSp>
+      <p:cxnSp>
+        <p:nvCxnSpPr>
+          <p:cNvPr id="75" name="Straight Arrow Connector 74">
+            <a:extLst>
+              <a:ext uri="{FF2B5EF4-FFF2-40B4-BE49-F238E27FC236}">
+                <a16:creationId xmlns:a16="http://schemas.microsoft.com/office/drawing/2014/main" id="{2D7C7F9A-1767-1A47-9D84-4C8C24F6DA50}"/>
+              </a:ext>
+            </a:extLst>
+          </p:cNvPr>
+          <p:cNvCxnSpPr>
+            <a:cxnSpLocks/>
+            <a:stCxn id="52" idx="3"/>
+            <a:endCxn id="36" idx="1"/>
+          </p:cNvCxnSpPr>
+          <p:nvPr/>
+        </p:nvCxnSpPr>
+        <p:spPr>
+          <a:xfrm flipV="1">
+            <a:off x="5541083" y="5047725"/>
+            <a:ext cx="659472" cy="4180"/>
+          </a:xfrm>
+          <a:prstGeom prst="straightConnector1">
+            <a:avLst/>
+          </a:prstGeom>
+          <a:ln w="12700">
+            <a:solidFill>
+              <a:schemeClr val="tx1"/>
+            </a:solidFill>
+            <a:tailEnd type="triangle"/>
+          </a:ln>
+        </p:spPr>
+        <p:style>
+          <a:lnRef idx="1">
+            <a:schemeClr val="accent1"/>
+          </a:lnRef>
+          <a:fillRef idx="0">
+            <a:schemeClr val="accent1"/>
+          </a:fillRef>
+          <a:effectRef idx="0">
+            <a:schemeClr val="accent1"/>
+          </a:effectRef>
+          <a:fontRef idx="minor">
+            <a:schemeClr val="tx1"/>
+          </a:fontRef>
+        </p:style>
+      </p:cxnSp>
+      <p:sp>
+        <p:nvSpPr>
+          <p:cNvPr id="78" name="TextBox 77">
+            <a:extLst>
+              <a:ext uri="{FF2B5EF4-FFF2-40B4-BE49-F238E27FC236}">
+                <a16:creationId xmlns:a16="http://schemas.microsoft.com/office/drawing/2014/main" id="{721D4F22-513D-92B2-ED68-0ABEA9A81FFA}"/>
+              </a:ext>
+            </a:extLst>
+          </p:cNvPr>
+          <p:cNvSpPr txBox="1"/>
+          <p:nvPr/>
+        </p:nvSpPr>
+        <p:spPr>
+          <a:xfrm>
+            <a:off x="2329374" y="3176842"/>
+            <a:ext cx="518161" cy="276999"/>
+          </a:xfrm>
+          <a:prstGeom prst="rect">
+            <a:avLst/>
+          </a:prstGeom>
+          <a:noFill/>
+        </p:spPr>
+        <p:txBody>
+          <a:bodyPr wrap="square" rtlCol="0">
+            <a:spAutoFit/>
+          </a:bodyPr>
+          <a:lstStyle/>
+          <a:p>
+            <a:r>
+              <a:rPr lang="en-US" sz="1200" err="1">
+                <a:latin typeface="Times New Roman" panose="02020603050405020304" pitchFamily="18" charset="0"/>
+                <a:cs typeface="Times New Roman" panose="02020603050405020304" pitchFamily="18" charset="0"/>
+              </a:rPr>
+              <a:t>tidak</a:t>
+            </a:r>
+            <a:endParaRPr lang="en-US" sz="1200">
+              <a:latin typeface="Times New Roman" panose="02020603050405020304" pitchFamily="18" charset="0"/>
+              <a:cs typeface="Times New Roman" panose="02020603050405020304" pitchFamily="18" charset="0"/>
+            </a:endParaRPr>
+          </a:p>
+        </p:txBody>
+      </p:sp>
+      <p:sp>
+        <p:nvSpPr>
+          <p:cNvPr id="79" name="TextBox 78">
+            <a:extLst>
+              <a:ext uri="{FF2B5EF4-FFF2-40B4-BE49-F238E27FC236}">
+                <a16:creationId xmlns:a16="http://schemas.microsoft.com/office/drawing/2014/main" id="{A873F3D3-F8B3-4656-A151-3BA6A316F944}"/>
+              </a:ext>
+            </a:extLst>
+          </p:cNvPr>
+          <p:cNvSpPr txBox="1"/>
+          <p:nvPr/>
+        </p:nvSpPr>
+        <p:spPr>
+          <a:xfrm>
+            <a:off x="2329374" y="1883316"/>
+            <a:ext cx="518161" cy="276999"/>
+          </a:xfrm>
+          <a:prstGeom prst="rect">
+            <a:avLst/>
+          </a:prstGeom>
+          <a:noFill/>
+        </p:spPr>
+        <p:txBody>
+          <a:bodyPr wrap="square" rtlCol="0">
+            <a:spAutoFit/>
+          </a:bodyPr>
+          <a:lstStyle/>
+          <a:p>
+            <a:r>
+              <a:rPr lang="en-US" sz="1200" err="1">
+                <a:latin typeface="Times New Roman" panose="02020603050405020304" pitchFamily="18" charset="0"/>
+                <a:cs typeface="Times New Roman" panose="02020603050405020304" pitchFamily="18" charset="0"/>
+              </a:rPr>
+              <a:t>tidak</a:t>
+            </a:r>
+            <a:endParaRPr lang="en-US" sz="1200">
+              <a:latin typeface="Times New Roman" panose="02020603050405020304" pitchFamily="18" charset="0"/>
+              <a:cs typeface="Times New Roman" panose="02020603050405020304" pitchFamily="18" charset="0"/>
+            </a:endParaRPr>
+          </a:p>
+        </p:txBody>
+      </p:sp>
+      <p:cxnSp>
+        <p:nvCxnSpPr>
+          <p:cNvPr id="80" name="Straight Connector 79">
+            <a:extLst>
+              <a:ext uri="{FF2B5EF4-FFF2-40B4-BE49-F238E27FC236}">
+                <a16:creationId xmlns:a16="http://schemas.microsoft.com/office/drawing/2014/main" id="{7602ECAA-0B0A-B7E8-FB52-D8B2193C4FF3}"/>
+              </a:ext>
+            </a:extLst>
+          </p:cNvPr>
+          <p:cNvCxnSpPr>
+            <a:cxnSpLocks/>
+            <a:stCxn id="14" idx="0"/>
+          </p:cNvCxnSpPr>
+          <p:nvPr/>
+        </p:nvCxnSpPr>
+        <p:spPr>
+          <a:xfrm flipV="1">
+            <a:off x="4942242" y="2149096"/>
+            <a:ext cx="0" cy="268469"/>
+          </a:xfrm>
+          <a:prstGeom prst="line">
+            <a:avLst/>
+          </a:prstGeom>
+          <a:ln w="12700">
+            <a:solidFill>
+              <a:schemeClr val="tx1"/>
+            </a:solidFill>
+          </a:ln>
+        </p:spPr>
+        <p:style>
+          <a:lnRef idx="1">
+            <a:schemeClr val="accent1"/>
+          </a:lnRef>
+          <a:fillRef idx="0">
+            <a:schemeClr val="accent1"/>
+          </a:fillRef>
+          <a:effectRef idx="0">
+            <a:schemeClr val="accent1"/>
+          </a:effectRef>
+          <a:fontRef idx="minor">
+            <a:schemeClr val="tx1"/>
+          </a:fontRef>
+        </p:style>
+      </p:cxnSp>
+      <p:cxnSp>
+        <p:nvCxnSpPr>
+          <p:cNvPr id="83" name="Straight Arrow Connector 82">
+            <a:extLst>
+              <a:ext uri="{FF2B5EF4-FFF2-40B4-BE49-F238E27FC236}">
+                <a16:creationId xmlns:a16="http://schemas.microsoft.com/office/drawing/2014/main" id="{73C6147E-1EB1-48D7-2988-9643A91794DB}"/>
+              </a:ext>
+            </a:extLst>
+          </p:cNvPr>
+          <p:cNvCxnSpPr>
+            <a:cxnSpLocks/>
+          </p:cNvCxnSpPr>
+          <p:nvPr/>
+        </p:nvCxnSpPr>
+        <p:spPr>
+          <a:xfrm flipH="1" flipV="1">
+            <a:off x="2847535" y="2149096"/>
+            <a:ext cx="2094707" cy="2686"/>
+          </a:xfrm>
+          <a:prstGeom prst="straightConnector1">
+            <a:avLst/>
+          </a:prstGeom>
+          <a:ln w="12700">
+            <a:solidFill>
+              <a:schemeClr val="tx1"/>
+            </a:solidFill>
+            <a:tailEnd type="triangle"/>
+          </a:ln>
+        </p:spPr>
+        <p:style>
+          <a:lnRef idx="1">
+            <a:schemeClr val="accent1"/>
+          </a:lnRef>
+          <a:fillRef idx="0">
+            <a:schemeClr val="accent1"/>
+          </a:fillRef>
+          <a:effectRef idx="0">
+            <a:schemeClr val="accent1"/>
+          </a:effectRef>
+          <a:fontRef idx="minor">
+            <a:schemeClr val="tx1"/>
+          </a:fontRef>
+        </p:style>
+      </p:cxnSp>
+      <p:cxnSp>
+        <p:nvCxnSpPr>
+          <p:cNvPr id="89" name="Straight Connector 88">
+            <a:extLst>
+              <a:ext uri="{FF2B5EF4-FFF2-40B4-BE49-F238E27FC236}">
+                <a16:creationId xmlns:a16="http://schemas.microsoft.com/office/drawing/2014/main" id="{FC5033ED-D8AC-C77C-BA32-467EF0541963}"/>
+              </a:ext>
+            </a:extLst>
+          </p:cNvPr>
+          <p:cNvCxnSpPr>
+            <a:cxnSpLocks/>
+          </p:cNvCxnSpPr>
+          <p:nvPr/>
+        </p:nvCxnSpPr>
+        <p:spPr>
+          <a:xfrm flipV="1">
+            <a:off x="4925088" y="3319561"/>
+            <a:ext cx="0" cy="268469"/>
+          </a:xfrm>
+          <a:prstGeom prst="line">
+            <a:avLst/>
+          </a:prstGeom>
+          <a:ln w="12700">
+            <a:solidFill>
+              <a:schemeClr val="tx1"/>
+            </a:solidFill>
+          </a:ln>
+        </p:spPr>
+        <p:style>
+          <a:lnRef idx="1">
+            <a:schemeClr val="accent1"/>
+          </a:lnRef>
+          <a:fillRef idx="0">
+            <a:schemeClr val="accent1"/>
+          </a:fillRef>
+          <a:effectRef idx="0">
+            <a:schemeClr val="accent1"/>
+          </a:effectRef>
+          <a:fontRef idx="minor">
+            <a:schemeClr val="tx1"/>
+          </a:fontRef>
+        </p:style>
+      </p:cxnSp>
+      <p:cxnSp>
+        <p:nvCxnSpPr>
+          <p:cNvPr id="90" name="Straight Arrow Connector 89">
+            <a:extLst>
+              <a:ext uri="{FF2B5EF4-FFF2-40B4-BE49-F238E27FC236}">
+                <a16:creationId xmlns:a16="http://schemas.microsoft.com/office/drawing/2014/main" id="{26D37F56-E1A1-4A8D-E898-EC0E2C54297A}"/>
+              </a:ext>
+            </a:extLst>
+          </p:cNvPr>
+          <p:cNvCxnSpPr>
+            <a:cxnSpLocks/>
+          </p:cNvCxnSpPr>
+          <p:nvPr/>
+        </p:nvCxnSpPr>
+        <p:spPr>
+          <a:xfrm flipH="1" flipV="1">
+            <a:off x="2830381" y="3319561"/>
+            <a:ext cx="2094707" cy="2686"/>
+          </a:xfrm>
+          <a:prstGeom prst="straightConnector1">
+            <a:avLst/>
+          </a:prstGeom>
+          <a:ln w="12700">
+            <a:solidFill>
+              <a:schemeClr val="tx1"/>
+            </a:solidFill>
+            <a:tailEnd type="triangle"/>
+          </a:ln>
+        </p:spPr>
+        <p:style>
+          <a:lnRef idx="1">
+            <a:schemeClr val="accent1"/>
+          </a:lnRef>
+          <a:fillRef idx="0">
+            <a:schemeClr val="accent1"/>
+          </a:fillRef>
+          <a:effectRef idx="0">
+            <a:schemeClr val="accent1"/>
+          </a:effectRef>
+          <a:fontRef idx="minor">
+            <a:schemeClr val="tx1"/>
+          </a:fontRef>
+        </p:style>
+      </p:cxnSp>
+      <p:sp>
+        <p:nvSpPr>
+          <p:cNvPr id="92" name="TextBox 91">
+            <a:extLst>
+              <a:ext uri="{FF2B5EF4-FFF2-40B4-BE49-F238E27FC236}">
+                <a16:creationId xmlns:a16="http://schemas.microsoft.com/office/drawing/2014/main" id="{048FDDA3-4D42-F44B-FE38-A608C3174630}"/>
+              </a:ext>
+            </a:extLst>
+          </p:cNvPr>
+          <p:cNvSpPr txBox="1"/>
+          <p:nvPr/>
+        </p:nvSpPr>
+        <p:spPr>
+          <a:xfrm>
+            <a:off x="4881361" y="3322358"/>
+            <a:ext cx="518161" cy="276999"/>
+          </a:xfrm>
+          <a:prstGeom prst="rect">
+            <a:avLst/>
+          </a:prstGeom>
+          <a:noFill/>
+        </p:spPr>
+        <p:txBody>
+          <a:bodyPr wrap="square" rtlCol="0">
+            <a:spAutoFit/>
+          </a:bodyPr>
+          <a:lstStyle/>
+          <a:p>
+            <a:r>
+              <a:rPr lang="en-US" sz="1200" err="1">
+                <a:latin typeface="Times New Roman" panose="02020603050405020304" pitchFamily="18" charset="0"/>
+                <a:cs typeface="Times New Roman" panose="02020603050405020304" pitchFamily="18" charset="0"/>
+              </a:rPr>
+              <a:t>tidak</a:t>
+            </a:r>
+            <a:endParaRPr lang="en-US" sz="1200">
+              <a:latin typeface="Times New Roman" panose="02020603050405020304" pitchFamily="18" charset="0"/>
+              <a:cs typeface="Times New Roman" panose="02020603050405020304" pitchFamily="18" charset="0"/>
+            </a:endParaRPr>
+          </a:p>
+        </p:txBody>
+      </p:sp>
+      <p:sp>
+        <p:nvSpPr>
+          <p:cNvPr id="93" name="TextBox 92">
+            <a:extLst>
+              <a:ext uri="{FF2B5EF4-FFF2-40B4-BE49-F238E27FC236}">
+                <a16:creationId xmlns:a16="http://schemas.microsoft.com/office/drawing/2014/main" id="{A9C2FDE2-125A-56EE-0ADC-38EEE833BC0B}"/>
+              </a:ext>
+            </a:extLst>
+          </p:cNvPr>
+          <p:cNvSpPr txBox="1"/>
+          <p:nvPr/>
+        </p:nvSpPr>
+        <p:spPr>
+          <a:xfrm>
+            <a:off x="4906038" y="2126569"/>
+            <a:ext cx="518161" cy="276999"/>
+          </a:xfrm>
+          <a:prstGeom prst="rect">
+            <a:avLst/>
+          </a:prstGeom>
+          <a:noFill/>
+        </p:spPr>
+        <p:txBody>
+          <a:bodyPr wrap="square" rtlCol="0">
+            <a:spAutoFit/>
+          </a:bodyPr>
+          <a:lstStyle/>
+          <a:p>
+            <a:r>
+              <a:rPr lang="en-US" sz="1200" err="1">
+                <a:latin typeface="Times New Roman" panose="02020603050405020304" pitchFamily="18" charset="0"/>
+                <a:cs typeface="Times New Roman" panose="02020603050405020304" pitchFamily="18" charset="0"/>
+              </a:rPr>
+              <a:t>tidak</a:t>
+            </a:r>
+            <a:endParaRPr lang="en-US" sz="1200">
+              <a:latin typeface="Times New Roman" panose="02020603050405020304" pitchFamily="18" charset="0"/>
+              <a:cs typeface="Times New Roman" panose="02020603050405020304" pitchFamily="18" charset="0"/>
+            </a:endParaRPr>
+          </a:p>
+        </p:txBody>
+      </p:sp>
+      <p:sp>
+        <p:nvSpPr>
+          <p:cNvPr id="94" name="TextBox 93">
+            <a:extLst>
+              <a:ext uri="{FF2B5EF4-FFF2-40B4-BE49-F238E27FC236}">
+                <a16:creationId xmlns:a16="http://schemas.microsoft.com/office/drawing/2014/main" id="{74BA992E-A582-065B-5CFF-1B84EC9242AC}"/>
+              </a:ext>
+            </a:extLst>
+          </p:cNvPr>
+          <p:cNvSpPr txBox="1"/>
+          <p:nvPr/>
+        </p:nvSpPr>
+        <p:spPr>
+          <a:xfrm>
+            <a:off x="3653133" y="3737485"/>
+            <a:ext cx="518161" cy="276999"/>
+          </a:xfrm>
+          <a:prstGeom prst="rect">
+            <a:avLst/>
+          </a:prstGeom>
+          <a:noFill/>
+        </p:spPr>
+        <p:txBody>
+          <a:bodyPr wrap="square" rtlCol="0">
+            <a:spAutoFit/>
+          </a:bodyPr>
+          <a:lstStyle/>
+          <a:p>
+            <a:r>
+              <a:rPr lang="en-US" sz="1200" err="1">
+                <a:latin typeface="Times New Roman" panose="02020603050405020304" pitchFamily="18" charset="0"/>
+                <a:cs typeface="Times New Roman" panose="02020603050405020304" pitchFamily="18" charset="0"/>
+              </a:rPr>
+              <a:t>ya</a:t>
+            </a:r>
+            <a:endParaRPr lang="en-US" sz="1200">
+              <a:latin typeface="Times New Roman" panose="02020603050405020304" pitchFamily="18" charset="0"/>
+              <a:cs typeface="Times New Roman" panose="02020603050405020304" pitchFamily="18" charset="0"/>
+            </a:endParaRPr>
+          </a:p>
+        </p:txBody>
+      </p:sp>
+      <p:sp>
+        <p:nvSpPr>
+          <p:cNvPr id="95" name="TextBox 94">
+            <a:extLst>
+              <a:ext uri="{FF2B5EF4-FFF2-40B4-BE49-F238E27FC236}">
+                <a16:creationId xmlns:a16="http://schemas.microsoft.com/office/drawing/2014/main" id="{3D1C28DB-C467-B8F5-8FCE-D18F16C4AD1C}"/>
+              </a:ext>
+            </a:extLst>
+          </p:cNvPr>
+          <p:cNvSpPr txBox="1"/>
+          <p:nvPr/>
+        </p:nvSpPr>
+        <p:spPr>
+          <a:xfrm>
+            <a:off x="3653133" y="2518791"/>
+            <a:ext cx="518161" cy="276999"/>
+          </a:xfrm>
+          <a:prstGeom prst="rect">
+            <a:avLst/>
+          </a:prstGeom>
+          <a:noFill/>
+        </p:spPr>
+        <p:txBody>
+          <a:bodyPr wrap="square" rtlCol="0">
+            <a:spAutoFit/>
+          </a:bodyPr>
+          <a:lstStyle/>
+          <a:p>
+            <a:r>
+              <a:rPr lang="en-US" sz="1200" err="1">
+                <a:latin typeface="Times New Roman" panose="02020603050405020304" pitchFamily="18" charset="0"/>
+                <a:cs typeface="Times New Roman" panose="02020603050405020304" pitchFamily="18" charset="0"/>
+              </a:rPr>
+              <a:t>ya</a:t>
+            </a:r>
+            <a:endParaRPr lang="en-US" sz="1200">
+              <a:latin typeface="Times New Roman" panose="02020603050405020304" pitchFamily="18" charset="0"/>
+              <a:cs typeface="Times New Roman" panose="02020603050405020304" pitchFamily="18" charset="0"/>
+            </a:endParaRPr>
+          </a:p>
+        </p:txBody>
+      </p:sp>
+      <p:sp>
+        <p:nvSpPr>
+          <p:cNvPr id="96" name="TextBox 95">
+            <a:extLst>
+              <a:ext uri="{FF2B5EF4-FFF2-40B4-BE49-F238E27FC236}">
+                <a16:creationId xmlns:a16="http://schemas.microsoft.com/office/drawing/2014/main" id="{4DB13A69-BD7A-0EB7-8A50-4F0291322A5E}"/>
+              </a:ext>
+            </a:extLst>
+          </p:cNvPr>
+          <p:cNvSpPr txBox="1"/>
+          <p:nvPr/>
+        </p:nvSpPr>
+        <p:spPr>
+          <a:xfrm>
+            <a:off x="5796832" y="3727434"/>
+            <a:ext cx="518161" cy="276999"/>
+          </a:xfrm>
+          <a:prstGeom prst="rect">
+            <a:avLst/>
+          </a:prstGeom>
+          <a:noFill/>
+        </p:spPr>
+        <p:txBody>
+          <a:bodyPr wrap="square" rtlCol="0">
+            <a:spAutoFit/>
+          </a:bodyPr>
+          <a:lstStyle/>
+          <a:p>
+            <a:r>
+              <a:rPr lang="en-US" sz="1200" err="1">
+                <a:latin typeface="Times New Roman" panose="02020603050405020304" pitchFamily="18" charset="0"/>
+                <a:cs typeface="Times New Roman" panose="02020603050405020304" pitchFamily="18" charset="0"/>
+              </a:rPr>
+              <a:t>ya</a:t>
+            </a:r>
+            <a:endParaRPr lang="en-US" sz="1200">
+              <a:latin typeface="Times New Roman" panose="02020603050405020304" pitchFamily="18" charset="0"/>
+              <a:cs typeface="Times New Roman" panose="02020603050405020304" pitchFamily="18" charset="0"/>
+            </a:endParaRPr>
+          </a:p>
+        </p:txBody>
+      </p:sp>
+      <p:sp>
+        <p:nvSpPr>
+          <p:cNvPr id="97" name="TextBox 96">
+            <a:extLst>
+              <a:ext uri="{FF2B5EF4-FFF2-40B4-BE49-F238E27FC236}">
+                <a16:creationId xmlns:a16="http://schemas.microsoft.com/office/drawing/2014/main" id="{5F2D2027-23AA-A6F4-612A-0756698634C7}"/>
+              </a:ext>
+            </a:extLst>
+          </p:cNvPr>
+          <p:cNvSpPr txBox="1"/>
+          <p:nvPr/>
+        </p:nvSpPr>
+        <p:spPr>
+          <a:xfrm>
+            <a:off x="5796832" y="2545642"/>
+            <a:ext cx="518161" cy="276999"/>
+          </a:xfrm>
+          <a:prstGeom prst="rect">
+            <a:avLst/>
+          </a:prstGeom>
+          <a:noFill/>
+        </p:spPr>
+        <p:txBody>
+          <a:bodyPr wrap="square" rtlCol="0">
+            <a:spAutoFit/>
+          </a:bodyPr>
+          <a:lstStyle/>
+          <a:p>
+            <a:r>
+              <a:rPr lang="en-US" sz="1200" err="1">
+                <a:latin typeface="Times New Roman" panose="02020603050405020304" pitchFamily="18" charset="0"/>
+                <a:cs typeface="Times New Roman" panose="02020603050405020304" pitchFamily="18" charset="0"/>
+              </a:rPr>
+              <a:t>ya</a:t>
+            </a:r>
+            <a:endParaRPr lang="en-US" sz="1200">
+              <a:latin typeface="Times New Roman" panose="02020603050405020304" pitchFamily="18" charset="0"/>
+              <a:cs typeface="Times New Roman" panose="02020603050405020304" pitchFamily="18" charset="0"/>
+            </a:endParaRPr>
+          </a:p>
+        </p:txBody>
+      </p:sp>
+      <p:sp>
+        <p:nvSpPr>
+          <p:cNvPr id="98" name="TextBox 97">
+            <a:extLst>
+              <a:ext uri="{FF2B5EF4-FFF2-40B4-BE49-F238E27FC236}">
+                <a16:creationId xmlns:a16="http://schemas.microsoft.com/office/drawing/2014/main" id="{897E3624-77BE-57F0-5946-223CD9A3F0B9}"/>
+              </a:ext>
+            </a:extLst>
+          </p:cNvPr>
+          <p:cNvSpPr txBox="1"/>
+          <p:nvPr/>
+        </p:nvSpPr>
+        <p:spPr>
+          <a:xfrm>
+            <a:off x="3644316" y="4783103"/>
+            <a:ext cx="518161" cy="276999"/>
+          </a:xfrm>
+          <a:prstGeom prst="rect">
+            <a:avLst/>
+          </a:prstGeom>
+          <a:noFill/>
+        </p:spPr>
+        <p:txBody>
+          <a:bodyPr wrap="square" rtlCol="0">
+            <a:spAutoFit/>
+          </a:bodyPr>
+          <a:lstStyle/>
+          <a:p>
+            <a:r>
+              <a:rPr lang="en-US" sz="1200" err="1">
+                <a:latin typeface="Times New Roman" panose="02020603050405020304" pitchFamily="18" charset="0"/>
+                <a:cs typeface="Times New Roman" panose="02020603050405020304" pitchFamily="18" charset="0"/>
+              </a:rPr>
+              <a:t>ya</a:t>
+            </a:r>
+            <a:endParaRPr lang="en-US" sz="1200">
+              <a:latin typeface="Times New Roman" panose="02020603050405020304" pitchFamily="18" charset="0"/>
+              <a:cs typeface="Times New Roman" panose="02020603050405020304" pitchFamily="18" charset="0"/>
+            </a:endParaRPr>
+          </a:p>
+        </p:txBody>
+      </p:sp>
+      <p:cxnSp>
+        <p:nvCxnSpPr>
+          <p:cNvPr id="102" name="Straight Arrow Connector 101">
+            <a:extLst>
+              <a:ext uri="{FF2B5EF4-FFF2-40B4-BE49-F238E27FC236}">
+                <a16:creationId xmlns:a16="http://schemas.microsoft.com/office/drawing/2014/main" id="{DA4644E7-7CEF-D09B-3BF8-677C803095D9}"/>
+              </a:ext>
+            </a:extLst>
+          </p:cNvPr>
+          <p:cNvCxnSpPr>
+            <a:cxnSpLocks/>
+            <a:endCxn id="67" idx="2"/>
+          </p:cNvCxnSpPr>
+          <p:nvPr/>
+        </p:nvCxnSpPr>
+        <p:spPr>
+          <a:xfrm>
+            <a:off x="2840378" y="5898221"/>
+            <a:ext cx="3314237" cy="1"/>
+          </a:xfrm>
+          <a:prstGeom prst="straightConnector1">
+            <a:avLst/>
+          </a:prstGeom>
+          <a:ln w="12700">
+            <a:solidFill>
+              <a:schemeClr val="tx1"/>
+            </a:solidFill>
+            <a:tailEnd type="triangle"/>
+          </a:ln>
+        </p:spPr>
+        <p:style>
+          <a:lnRef idx="1">
+            <a:schemeClr val="accent1"/>
+          </a:lnRef>
+          <a:fillRef idx="0">
+            <a:schemeClr val="accent1"/>
+          </a:fillRef>
+          <a:effectRef idx="0">
+            <a:schemeClr val="accent1"/>
+          </a:effectRef>
+          <a:fontRef idx="minor">
+            <a:schemeClr val="tx1"/>
+          </a:fontRef>
+        </p:style>
+      </p:cxnSp>
+      <p:cxnSp>
+        <p:nvCxnSpPr>
+          <p:cNvPr id="105" name="Straight Connector 104">
+            <a:extLst>
+              <a:ext uri="{FF2B5EF4-FFF2-40B4-BE49-F238E27FC236}">
+                <a16:creationId xmlns:a16="http://schemas.microsoft.com/office/drawing/2014/main" id="{2DE51BA4-750A-124D-6FD7-07B0CF90CBF6}"/>
+              </a:ext>
+            </a:extLst>
+          </p:cNvPr>
+          <p:cNvCxnSpPr>
+            <a:cxnSpLocks/>
+            <a:stCxn id="10" idx="2"/>
+          </p:cNvCxnSpPr>
+          <p:nvPr/>
+        </p:nvCxnSpPr>
+        <p:spPr>
+          <a:xfrm>
+            <a:off x="2822135" y="5432949"/>
+            <a:ext cx="8245" cy="465272"/>
+          </a:xfrm>
+          <a:prstGeom prst="line">
+            <a:avLst/>
+          </a:prstGeom>
+          <a:ln w="12700">
+            <a:solidFill>
+              <a:schemeClr val="tx1"/>
+            </a:solidFill>
+          </a:ln>
+        </p:spPr>
+        <p:style>
+          <a:lnRef idx="1">
+            <a:schemeClr val="accent1"/>
+          </a:lnRef>
+          <a:fillRef idx="0">
+            <a:schemeClr val="accent1"/>
+          </a:fillRef>
+          <a:effectRef idx="0">
+            <a:schemeClr val="accent1"/>
+          </a:effectRef>
+          <a:fontRef idx="minor">
+            <a:schemeClr val="tx1"/>
+          </a:fontRef>
+        </p:style>
+      </p:cxnSp>
+      <p:sp>
+        <p:nvSpPr>
+          <p:cNvPr id="108" name="TextBox 107">
+            <a:extLst>
+              <a:ext uri="{FF2B5EF4-FFF2-40B4-BE49-F238E27FC236}">
+                <a16:creationId xmlns:a16="http://schemas.microsoft.com/office/drawing/2014/main" id="{B44DD237-50AC-8FAF-B3BF-F7888E2E4D35}"/>
+              </a:ext>
+            </a:extLst>
+          </p:cNvPr>
+          <p:cNvSpPr txBox="1"/>
+          <p:nvPr/>
+        </p:nvSpPr>
+        <p:spPr>
+          <a:xfrm>
+            <a:off x="2329374" y="5500620"/>
+            <a:ext cx="518161" cy="276999"/>
+          </a:xfrm>
+          <a:prstGeom prst="rect">
+            <a:avLst/>
+          </a:prstGeom>
+          <a:noFill/>
+        </p:spPr>
+        <p:txBody>
+          <a:bodyPr wrap="square" rtlCol="0">
+            <a:spAutoFit/>
+          </a:bodyPr>
+          <a:lstStyle/>
+          <a:p>
+            <a:r>
+              <a:rPr lang="en-US" sz="1200" err="1">
+                <a:latin typeface="Times New Roman" panose="02020603050405020304" pitchFamily="18" charset="0"/>
+                <a:cs typeface="Times New Roman" panose="02020603050405020304" pitchFamily="18" charset="0"/>
+              </a:rPr>
+              <a:t>tidak</a:t>
+            </a:r>
+            <a:endParaRPr lang="en-US" sz="1200">
+              <a:latin typeface="Times New Roman" panose="02020603050405020304" pitchFamily="18" charset="0"/>
+              <a:cs typeface="Times New Roman" panose="02020603050405020304" pitchFamily="18" charset="0"/>
+            </a:endParaRPr>
+          </a:p>
+        </p:txBody>
+      </p:sp>
+    </p:spTree>
+    <p:extLst>
+      <p:ext uri="{BB962C8B-B14F-4D97-AF65-F5344CB8AC3E}">
+        <p14:creationId xmlns:p14="http://schemas.microsoft.com/office/powerpoint/2010/main" val="716387312"/>
       </p:ext>
     </p:extLst>
   </p:cSld>

</xml_diff>